<commit_message>
Versão 1.1 do PGC, Alteração de nome de Documento de Riscos, Versão 0.2 de PPJ
</commit_message>
<xml_diff>
--- a/02-PROJETO-2015.2/01-GERENCIA DE PROJETO/PPJ-Plano de Projeto.pptx
+++ b/02-PROJETO-2015.2/01-GERENCIA DE PROJETO/PPJ-Plano de Projeto.pptx
@@ -3180,25 +3180,6 @@
               <a:t>Projeto</a:t>
             </a:r>
             <a:endParaRPr lang="pt-BR" b="1" dirty="0"/>
-          </a:p>
-        </p:txBody>
-      </p:sp>
-      <p:sp>
-        <p:nvSpPr>
-          <p:cNvPr id="3" name="Subtitle 2"/>
-          <p:cNvSpPr>
-            <a:spLocks noGrp="1"/>
-          </p:cNvSpPr>
-          <p:nvPr>
-            <p:ph type="subTitle" idx="1"/>
-          </p:nvPr>
-        </p:nvSpPr>
-        <p:spPr/>
-        <p:txBody>
-          <a:bodyPr/>
-          <a:lstStyle/>
-          <a:p>
-            <a:endParaRPr lang="pt-BR" dirty="0"/>
           </a:p>
         </p:txBody>
       </p:sp>
@@ -4892,11 +4873,7 @@
                       </a:pPr>
                       <a:r>
                         <a:rPr lang="pt-BR" dirty="0" smtClean="0"/>
-                        <a:t>Luiz Antonio Pereira Silva, </a:t>
-                      </a:r>
-                      <a:r>
-                        <a:rPr lang="pt-BR" dirty="0" smtClean="0"/>
-                        <a:t>Joaquim José Cintra Maia Honório</a:t>
+                        <a:t>Luiz Antonio Pereira Silva, Joaquim José Cintra Maia Honório</a:t>
                       </a:r>
                     </a:p>
                   </a:txBody>

</xml_diff>

<commit_message>
Versão 0.2 do PPJ
</commit_message>
<xml_diff>
--- a/02-PROJETO-2015.2/01-GERENCIA DE PROJETO/PPJ-Plano de Projeto.pptx
+++ b/02-PROJETO-2015.2/01-GERENCIA DE PROJETO/PPJ-Plano de Projeto.pptx
@@ -22,6 +22,9 @@
     <p:sldId id="260" r:id="rId16"/>
     <p:sldId id="262" r:id="rId17"/>
     <p:sldId id="263" r:id="rId18"/>
+    <p:sldId id="274" r:id="rId19"/>
+    <p:sldId id="275" r:id="rId20"/>
+    <p:sldId id="276" r:id="rId21"/>
   </p:sldIdLst>
   <p:sldSz cx="9144000" cy="6858000" type="screen4x3"/>
   <p:notesSz cx="6858000" cy="9144000"/>
@@ -320,7 +323,7 @@
           <a:p>
             <a:fld id="{E47D05A7-B3F5-44B5-A242-7B096322FBAF}" type="datetimeFigureOut">
               <a:rPr lang="pt-BR" smtClean="0"/>
-              <a:t>05/12/2015</a:t>
+              <a:t>06/12/2015</a:t>
             </a:fld>
             <a:endParaRPr lang="pt-BR"/>
           </a:p>
@@ -490,7 +493,7 @@
           <a:p>
             <a:fld id="{E47D05A7-B3F5-44B5-A242-7B096322FBAF}" type="datetimeFigureOut">
               <a:rPr lang="pt-BR" smtClean="0"/>
-              <a:t>05/12/2015</a:t>
+              <a:t>06/12/2015</a:t>
             </a:fld>
             <a:endParaRPr lang="pt-BR"/>
           </a:p>
@@ -670,7 +673,7 @@
           <a:p>
             <a:fld id="{E47D05A7-B3F5-44B5-A242-7B096322FBAF}" type="datetimeFigureOut">
               <a:rPr lang="pt-BR" smtClean="0"/>
-              <a:t>05/12/2015</a:t>
+              <a:t>06/12/2015</a:t>
             </a:fld>
             <a:endParaRPr lang="pt-BR"/>
           </a:p>
@@ -840,7 +843,7 @@
           <a:p>
             <a:fld id="{E47D05A7-B3F5-44B5-A242-7B096322FBAF}" type="datetimeFigureOut">
               <a:rPr lang="pt-BR" smtClean="0"/>
-              <a:t>05/12/2015</a:t>
+              <a:t>06/12/2015</a:t>
             </a:fld>
             <a:endParaRPr lang="pt-BR"/>
           </a:p>
@@ -1086,7 +1089,7 @@
           <a:p>
             <a:fld id="{E47D05A7-B3F5-44B5-A242-7B096322FBAF}" type="datetimeFigureOut">
               <a:rPr lang="pt-BR" smtClean="0"/>
-              <a:t>05/12/2015</a:t>
+              <a:t>06/12/2015</a:t>
             </a:fld>
             <a:endParaRPr lang="pt-BR"/>
           </a:p>
@@ -1374,7 +1377,7 @@
           <a:p>
             <a:fld id="{E47D05A7-B3F5-44B5-A242-7B096322FBAF}" type="datetimeFigureOut">
               <a:rPr lang="pt-BR" smtClean="0"/>
-              <a:t>05/12/2015</a:t>
+              <a:t>06/12/2015</a:t>
             </a:fld>
             <a:endParaRPr lang="pt-BR"/>
           </a:p>
@@ -1796,7 +1799,7 @@
           <a:p>
             <a:fld id="{E47D05A7-B3F5-44B5-A242-7B096322FBAF}" type="datetimeFigureOut">
               <a:rPr lang="pt-BR" smtClean="0"/>
-              <a:t>05/12/2015</a:t>
+              <a:t>06/12/2015</a:t>
             </a:fld>
             <a:endParaRPr lang="pt-BR"/>
           </a:p>
@@ -1914,7 +1917,7 @@
           <a:p>
             <a:fld id="{E47D05A7-B3F5-44B5-A242-7B096322FBAF}" type="datetimeFigureOut">
               <a:rPr lang="pt-BR" smtClean="0"/>
-              <a:t>05/12/2015</a:t>
+              <a:t>06/12/2015</a:t>
             </a:fld>
             <a:endParaRPr lang="pt-BR"/>
           </a:p>
@@ -2009,7 +2012,7 @@
           <a:p>
             <a:fld id="{E47D05A7-B3F5-44B5-A242-7B096322FBAF}" type="datetimeFigureOut">
               <a:rPr lang="pt-BR" smtClean="0"/>
-              <a:t>05/12/2015</a:t>
+              <a:t>06/12/2015</a:t>
             </a:fld>
             <a:endParaRPr lang="pt-BR"/>
           </a:p>
@@ -2286,7 +2289,7 @@
           <a:p>
             <a:fld id="{E47D05A7-B3F5-44B5-A242-7B096322FBAF}" type="datetimeFigureOut">
               <a:rPr lang="pt-BR" smtClean="0"/>
-              <a:t>05/12/2015</a:t>
+              <a:t>06/12/2015</a:t>
             </a:fld>
             <a:endParaRPr lang="pt-BR"/>
           </a:p>
@@ -2539,7 +2542,7 @@
           <a:p>
             <a:fld id="{E47D05A7-B3F5-44B5-A242-7B096322FBAF}" type="datetimeFigureOut">
               <a:rPr lang="pt-BR" smtClean="0"/>
-              <a:t>05/12/2015</a:t>
+              <a:t>06/12/2015</a:t>
             </a:fld>
             <a:endParaRPr lang="pt-BR"/>
           </a:p>
@@ -2752,7 +2755,7 @@
           <a:p>
             <a:fld id="{E47D05A7-B3F5-44B5-A242-7B096322FBAF}" type="datetimeFigureOut">
               <a:rPr lang="pt-BR" smtClean="0"/>
-              <a:t>05/12/2015</a:t>
+              <a:t>06/12/2015</a:t>
             </a:fld>
             <a:endParaRPr lang="pt-BR"/>
           </a:p>
@@ -3193,6 +3196,13 @@
   <p:clrMapOvr>
     <a:masterClrMapping/>
   </p:clrMapOvr>
+  <p:timing>
+    <p:tnLst>
+      <p:par>
+        <p:cTn id="1" dur="indefinite" restart="never" nodeType="tmRoot"/>
+      </p:par>
+    </p:tnLst>
+  </p:timing>
 </p:sld>
 </file>
 
@@ -4715,6 +4725,13 @@
   <p:clrMapOvr>
     <a:masterClrMapping/>
   </p:clrMapOvr>
+  <p:timing>
+    <p:tnLst>
+      <p:par>
+        <p:cTn id="1" dur="indefinite" restart="never" nodeType="tmRoot"/>
+      </p:par>
+    </p:tnLst>
+  </p:timing>
 </p:sld>
 </file>
 
@@ -5047,6 +5064,13 @@
   <p:clrMapOvr>
     <a:masterClrMapping/>
   </p:clrMapOvr>
+  <p:timing>
+    <p:tnLst>
+      <p:par>
+        <p:cTn id="1" dur="indefinite" restart="never" nodeType="tmRoot"/>
+      </p:par>
+    </p:tnLst>
+  </p:timing>
 </p:sld>
 </file>
 
@@ -5098,197 +5122,1130 @@
           </a:p>
         </p:txBody>
       </p:sp>
-      <p:sp>
-        <p:nvSpPr>
-          <p:cNvPr id="3" name="Content Placeholder 2"/>
-          <p:cNvSpPr>
-            <a:spLocks noGrp="1"/>
-          </p:cNvSpPr>
+      <p:graphicFrame>
+        <p:nvGraphicFramePr>
+          <p:cNvPr id="5" name="Tabela 4"/>
+          <p:cNvGraphicFramePr>
+            <a:graphicFrameLocks noGrp="1"/>
+          </p:cNvGraphicFramePr>
           <p:nvPr>
-            <p:ph idx="1"/>
+            <p:extLst>
+              <p:ext uri="{D42A27DB-BD31-4B8C-83A1-F6EECF244321}">
+                <p14:modId xmlns:p14="http://schemas.microsoft.com/office/powerpoint/2010/main" val="4252500161"/>
+              </p:ext>
+            </p:extLst>
           </p:nvPr>
-        </p:nvSpPr>
-        <p:spPr/>
-        <p:txBody>
-          <a:bodyPr/>
-          <a:lstStyle/>
-          <a:p>
-            <a:r>
-              <a:rPr lang="en-US" dirty="0" smtClean="0"/>
-              <a:t>&lt;&lt;</a:t>
-            </a:r>
-            <a:r>
-              <a:rPr lang="en-US" dirty="0" err="1" smtClean="0"/>
-              <a:t>Definir</a:t>
-            </a:r>
-            <a:r>
-              <a:rPr lang="en-US" dirty="0" smtClean="0"/>
-              <a:t> </a:t>
-            </a:r>
-            <a:r>
-              <a:rPr lang="en-US" dirty="0" err="1" smtClean="0"/>
-              <a:t>aqui</a:t>
-            </a:r>
-            <a:r>
-              <a:rPr lang="en-US" dirty="0" smtClean="0"/>
-              <a:t> o </a:t>
-            </a:r>
-            <a:r>
-              <a:rPr lang="en-US" dirty="0" err="1" smtClean="0"/>
-              <a:t>escopo</a:t>
-            </a:r>
-            <a:r>
-              <a:rPr lang="en-US" dirty="0" smtClean="0"/>
-              <a:t> do </a:t>
-            </a:r>
-            <a:r>
-              <a:rPr lang="en-US" dirty="0" err="1" smtClean="0"/>
-              <a:t>projeto</a:t>
-            </a:r>
-            <a:r>
-              <a:rPr lang="en-US" dirty="0" smtClean="0"/>
-              <a:t>. O </a:t>
-            </a:r>
-            <a:r>
-              <a:rPr lang="en-US" dirty="0" err="1" smtClean="0"/>
-              <a:t>mesmo</a:t>
-            </a:r>
-            <a:r>
-              <a:rPr lang="en-US" dirty="0" smtClean="0"/>
-              <a:t> </a:t>
-            </a:r>
-            <a:r>
-              <a:rPr lang="en-US" dirty="0" err="1" smtClean="0"/>
-              <a:t>deve</a:t>
-            </a:r>
-            <a:r>
-              <a:rPr lang="en-US" dirty="0" smtClean="0"/>
-              <a:t> </a:t>
-            </a:r>
-            <a:r>
-              <a:rPr lang="en-US" dirty="0" err="1" smtClean="0"/>
-              <a:t>ser</a:t>
-            </a:r>
-            <a:r>
-              <a:rPr lang="en-US" dirty="0" smtClean="0"/>
-              <a:t> </a:t>
-            </a:r>
-            <a:r>
-              <a:rPr lang="en-US" dirty="0" err="1" smtClean="0"/>
-              <a:t>exibido</a:t>
-            </a:r>
-            <a:r>
-              <a:rPr lang="en-US" dirty="0" smtClean="0"/>
-              <a:t> </a:t>
-            </a:r>
-            <a:r>
-              <a:rPr lang="en-US" dirty="0" err="1" smtClean="0"/>
-              <a:t>em</a:t>
-            </a:r>
-            <a:r>
-              <a:rPr lang="en-US" dirty="0" smtClean="0"/>
-              <a:t> forma de </a:t>
-            </a:r>
-            <a:r>
-              <a:rPr lang="en-US" dirty="0" err="1" smtClean="0"/>
-              <a:t>itens</a:t>
-            </a:r>
-            <a:r>
-              <a:rPr lang="en-US" dirty="0" smtClean="0"/>
-              <a:t> de backlog. </a:t>
-            </a:r>
-            <a:r>
-              <a:rPr lang="en-US" dirty="0" err="1" smtClean="0"/>
-              <a:t>Quais</a:t>
-            </a:r>
-            <a:r>
-              <a:rPr lang="en-US" dirty="0" smtClean="0"/>
-              <a:t> </a:t>
-            </a:r>
-            <a:r>
-              <a:rPr lang="en-US" dirty="0" err="1" smtClean="0"/>
-              <a:t>itens</a:t>
-            </a:r>
-            <a:r>
-              <a:rPr lang="en-US" dirty="0" smtClean="0"/>
-              <a:t> de backlog </a:t>
-            </a:r>
-            <a:r>
-              <a:rPr lang="en-US" dirty="0" err="1" smtClean="0"/>
-              <a:t>serão</a:t>
-            </a:r>
-            <a:r>
-              <a:rPr lang="en-US" dirty="0" smtClean="0"/>
-              <a:t> </a:t>
-            </a:r>
-            <a:r>
-              <a:rPr lang="en-US" dirty="0" err="1" smtClean="0"/>
-              <a:t>atacados</a:t>
-            </a:r>
-            <a:r>
-              <a:rPr lang="en-US" dirty="0" smtClean="0"/>
-              <a:t> </a:t>
-            </a:r>
-            <a:r>
-              <a:rPr lang="en-US" dirty="0" err="1" smtClean="0"/>
-              <a:t>em</a:t>
-            </a:r>
-            <a:r>
-              <a:rPr lang="en-US" dirty="0" smtClean="0"/>
-              <a:t> </a:t>
-            </a:r>
-            <a:r>
-              <a:rPr lang="en-US" dirty="0" err="1" smtClean="0"/>
-              <a:t>que</a:t>
-            </a:r>
-            <a:r>
-              <a:rPr lang="en-US" dirty="0" smtClean="0"/>
-              <a:t> </a:t>
-            </a:r>
-            <a:r>
-              <a:rPr lang="en-US" dirty="0" err="1" smtClean="0"/>
-              <a:t>iteração</a:t>
-            </a:r>
-            <a:r>
-              <a:rPr lang="en-US" dirty="0" smtClean="0"/>
-              <a:t> e </a:t>
-            </a:r>
-            <a:r>
-              <a:rPr lang="en-US" dirty="0" err="1" smtClean="0"/>
-              <a:t>quais</a:t>
-            </a:r>
-            <a:r>
-              <a:rPr lang="en-US" dirty="0" smtClean="0"/>
-              <a:t> as </a:t>
-            </a:r>
-            <a:r>
-              <a:rPr lang="en-US" dirty="0" err="1" smtClean="0"/>
-              <a:t>iterações</a:t>
-            </a:r>
-            <a:r>
-              <a:rPr lang="en-US" dirty="0" smtClean="0"/>
-              <a:t> </a:t>
-            </a:r>
-            <a:r>
-              <a:rPr lang="en-US" dirty="0" err="1" smtClean="0"/>
-              <a:t>pertencentes</a:t>
-            </a:r>
-            <a:r>
-              <a:rPr lang="en-US" dirty="0" smtClean="0"/>
-              <a:t> a </a:t>
-            </a:r>
-            <a:r>
-              <a:rPr lang="en-US" dirty="0" err="1" smtClean="0"/>
-              <a:t>cada</a:t>
-            </a:r>
-            <a:r>
-              <a:rPr lang="en-US" dirty="0" smtClean="0"/>
-              <a:t> release.&gt;&gt;</a:t>
-            </a:r>
-            <a:endParaRPr lang="pt-BR" dirty="0"/>
-          </a:p>
-        </p:txBody>
-      </p:sp>
+        </p:nvGraphicFramePr>
+        <p:xfrm>
+          <a:off x="683568" y="1253903"/>
+          <a:ext cx="7920879" cy="5560013"/>
+        </p:xfrm>
+        <a:graphic>
+          <a:graphicData uri="http://schemas.openxmlformats.org/drawingml/2006/table">
+            <a:tbl>
+              <a:tblPr firstRow="1">
+                <a:tableStyleId>{073A0DAA-6AF3-43AB-8588-CEC1D06C72B9}</a:tableStyleId>
+              </a:tblPr>
+              <a:tblGrid>
+                <a:gridCol w="1512168">
+                  <a:extLst>
+                    <a:ext uri="{9D8B030D-6E8A-4147-A177-3AD203B41FA5}">
+                      <a16:colId xmlns:a16="http://schemas.microsoft.com/office/drawing/2014/main" val="940830599"/>
+                    </a:ext>
+                  </a:extLst>
+                </a:gridCol>
+                <a:gridCol w="4248472">
+                  <a:extLst>
+                    <a:ext uri="{9D8B030D-6E8A-4147-A177-3AD203B41FA5}">
+                      <a16:colId xmlns:a16="http://schemas.microsoft.com/office/drawing/2014/main" val="590859807"/>
+                    </a:ext>
+                  </a:extLst>
+                </a:gridCol>
+                <a:gridCol w="945105">
+                  <a:extLst>
+                    <a:ext uri="{9D8B030D-6E8A-4147-A177-3AD203B41FA5}">
+                      <a16:colId xmlns:a16="http://schemas.microsoft.com/office/drawing/2014/main" val="1644708125"/>
+                    </a:ext>
+                  </a:extLst>
+                </a:gridCol>
+                <a:gridCol w="1215134">
+                  <a:extLst>
+                    <a:ext uri="{9D8B030D-6E8A-4147-A177-3AD203B41FA5}">
+                      <a16:colId xmlns:a16="http://schemas.microsoft.com/office/drawing/2014/main" val="3964080166"/>
+                    </a:ext>
+                  </a:extLst>
+                </a:gridCol>
+              </a:tblGrid>
+              <a:tr h="474671">
+                <a:tc>
+                  <a:txBody>
+                    <a:bodyPr/>
+                    <a:lstStyle/>
+                    <a:p>
+                      <a:pPr algn="ctr" rtl="0" fontAlgn="b">
+                        <a:spcBef>
+                          <a:spcPts val="0"/>
+                        </a:spcBef>
+                        <a:spcAft>
+                          <a:spcPts val="0"/>
+                        </a:spcAft>
+                      </a:pPr>
+                      <a:r>
+                        <a:rPr lang="pt-BR" sz="1800" b="0" baseline="0" dirty="0" smtClean="0">
+                          <a:effectLst/>
+                          <a:latin typeface="+mn-lt"/>
+                        </a:rPr>
+                        <a:t>Iteração</a:t>
+                      </a:r>
+                      <a:endParaRPr lang="pt-BR" sz="1800" b="0" dirty="0">
+                        <a:effectLst/>
+                        <a:latin typeface="+mn-lt"/>
+                      </a:endParaRPr>
+                    </a:p>
+                  </a:txBody>
+                  <a:tcPr marL="30614" marR="30614" marT="29389" marB="29389" anchor="ctr"/>
+                </a:tc>
+                <a:tc>
+                  <a:txBody>
+                    <a:bodyPr/>
+                    <a:lstStyle/>
+                    <a:p>
+                      <a:pPr algn="ctr" rtl="0" fontAlgn="b">
+                        <a:spcBef>
+                          <a:spcPts val="0"/>
+                        </a:spcBef>
+                        <a:spcAft>
+                          <a:spcPts val="0"/>
+                        </a:spcAft>
+                      </a:pPr>
+                      <a:r>
+                        <a:rPr lang="pt-BR" sz="1800" b="0" dirty="0">
+                          <a:effectLst/>
+                        </a:rPr>
+                        <a:t>Descrição de </a:t>
+                      </a:r>
+                      <a:r>
+                        <a:rPr lang="pt-BR" sz="1800" b="0" dirty="0" smtClean="0">
+                          <a:effectLst/>
+                        </a:rPr>
+                        <a:t>IB</a:t>
+                      </a:r>
+                      <a:endParaRPr lang="pt-BR" sz="1800" b="0" dirty="0">
+                        <a:effectLst/>
+                        <a:latin typeface="arial" panose="020B0604020202020204" pitchFamily="34" charset="0"/>
+                      </a:endParaRPr>
+                    </a:p>
+                  </a:txBody>
+                  <a:tcPr marL="30614" marR="30614" marT="29389" marB="29389" anchor="ctr"/>
+                </a:tc>
+                <a:tc>
+                  <a:txBody>
+                    <a:bodyPr/>
+                    <a:lstStyle/>
+                    <a:p>
+                      <a:pPr algn="ctr" rtl="0" fontAlgn="ctr">
+                        <a:spcBef>
+                          <a:spcPts val="0"/>
+                        </a:spcBef>
+                        <a:spcAft>
+                          <a:spcPts val="0"/>
+                        </a:spcAft>
+                      </a:pPr>
+                      <a:r>
+                        <a:rPr lang="pt-BR" sz="1800" b="0" dirty="0">
+                          <a:effectLst/>
+                        </a:rPr>
+                        <a:t>Release</a:t>
+                      </a:r>
+                      <a:endParaRPr lang="pt-BR" sz="1800" b="0" dirty="0">
+                        <a:effectLst/>
+                        <a:latin typeface="arial" panose="020B0604020202020204" pitchFamily="34" charset="0"/>
+                      </a:endParaRPr>
+                    </a:p>
+                  </a:txBody>
+                  <a:tcPr marL="30614" marR="30614" marT="29389" marB="29389" anchor="ctr"/>
+                </a:tc>
+                <a:tc>
+                  <a:txBody>
+                    <a:bodyPr/>
+                    <a:lstStyle/>
+                    <a:p>
+                      <a:pPr algn="ctr" rtl="0" fontAlgn="ctr">
+                        <a:spcBef>
+                          <a:spcPts val="0"/>
+                        </a:spcBef>
+                        <a:spcAft>
+                          <a:spcPts val="0"/>
+                        </a:spcAft>
+                      </a:pPr>
+                      <a:r>
+                        <a:rPr lang="pt-BR" sz="1800" b="0" dirty="0">
+                          <a:effectLst/>
+                        </a:rPr>
+                        <a:t>Data de Entrega</a:t>
+                      </a:r>
+                      <a:endParaRPr lang="pt-BR" sz="1800" b="0" dirty="0">
+                        <a:effectLst/>
+                        <a:latin typeface="arial" panose="020B0604020202020204" pitchFamily="34" charset="0"/>
+                      </a:endParaRPr>
+                    </a:p>
+                  </a:txBody>
+                  <a:tcPr marL="30614" marR="30614" marT="29389" marB="29389" anchor="ctr"/>
+                </a:tc>
+                <a:extLst>
+                  <a:ext uri="{0D108BD9-81ED-4DB2-BD59-A6C34878D82A}">
+                    <a16:rowId xmlns:a16="http://schemas.microsoft.com/office/drawing/2014/main" val="2778541480"/>
+                  </a:ext>
+                </a:extLst>
+              </a:tr>
+              <a:tr h="270195">
+                <a:tc>
+                  <a:txBody>
+                    <a:bodyPr/>
+                    <a:lstStyle/>
+                    <a:p>
+                      <a:pPr algn="ctr" rtl="0" fontAlgn="b">
+                        <a:spcBef>
+                          <a:spcPts val="0"/>
+                        </a:spcBef>
+                        <a:spcAft>
+                          <a:spcPts val="0"/>
+                        </a:spcAft>
+                      </a:pPr>
+                      <a:r>
+                        <a:rPr lang="pt-BR" sz="1600" dirty="0" smtClean="0">
+                          <a:effectLst/>
+                          <a:latin typeface="+mn-lt"/>
+                        </a:rPr>
+                        <a:t>1</a:t>
+                      </a:r>
+                      <a:endParaRPr lang="pt-BR" sz="1600" dirty="0">
+                        <a:effectLst/>
+                        <a:latin typeface="+mn-lt"/>
+                      </a:endParaRPr>
+                    </a:p>
+                  </a:txBody>
+                  <a:tcPr marL="30614" marR="30614" marT="29389" marB="29389" anchor="ctr"/>
+                </a:tc>
+                <a:tc>
+                  <a:txBody>
+                    <a:bodyPr/>
+                    <a:lstStyle/>
+                    <a:p>
+                      <a:pPr algn="l" rtl="0" fontAlgn="b">
+                        <a:spcBef>
+                          <a:spcPts val="0"/>
+                        </a:spcBef>
+                        <a:spcAft>
+                          <a:spcPts val="0"/>
+                        </a:spcAft>
+                      </a:pPr>
+                      <a:r>
+                        <a:rPr lang="pt-BR" sz="1600" dirty="0" err="1">
+                          <a:effectLst/>
+                        </a:rPr>
+                        <a:t>Login</a:t>
+                      </a:r>
+                      <a:endParaRPr lang="pt-BR" sz="1600" dirty="0">
+                        <a:effectLst/>
+                        <a:latin typeface="arial" panose="020B0604020202020204" pitchFamily="34" charset="0"/>
+                      </a:endParaRPr>
+                    </a:p>
+                  </a:txBody>
+                  <a:tcPr marL="30614" marR="30614" marT="29389" marB="29389" anchor="ctr"/>
+                </a:tc>
+                <a:tc rowSpan="9">
+                  <a:txBody>
+                    <a:bodyPr/>
+                    <a:lstStyle/>
+                    <a:p>
+                      <a:pPr algn="ctr" rtl="0" fontAlgn="ctr">
+                        <a:spcBef>
+                          <a:spcPts val="0"/>
+                        </a:spcBef>
+                        <a:spcAft>
+                          <a:spcPts val="0"/>
+                        </a:spcAft>
+                      </a:pPr>
+                      <a:r>
+                        <a:rPr lang="pt-BR" sz="1600" dirty="0">
+                          <a:effectLst/>
+                        </a:rPr>
+                        <a:t>1</a:t>
+                      </a:r>
+                      <a:endParaRPr lang="pt-BR" sz="1600" dirty="0">
+                        <a:effectLst/>
+                        <a:latin typeface="arial" panose="020B0604020202020204" pitchFamily="34" charset="0"/>
+                      </a:endParaRPr>
+                    </a:p>
+                  </a:txBody>
+                  <a:tcPr marL="30614" marR="30614" marT="29389" marB="29389" anchor="ctr"/>
+                </a:tc>
+                <a:tc rowSpan="9">
+                  <a:txBody>
+                    <a:bodyPr/>
+                    <a:lstStyle/>
+                    <a:p>
+                      <a:pPr algn="ctr" rtl="0" fontAlgn="ctr">
+                        <a:spcBef>
+                          <a:spcPts val="0"/>
+                        </a:spcBef>
+                        <a:spcAft>
+                          <a:spcPts val="0"/>
+                        </a:spcAft>
+                      </a:pPr>
+                      <a:r>
+                        <a:rPr lang="pt-BR" sz="1600" dirty="0">
+                          <a:effectLst/>
+                        </a:rPr>
+                        <a:t>30.03.2016</a:t>
+                      </a:r>
+                      <a:endParaRPr lang="pt-BR" sz="1600" dirty="0">
+                        <a:effectLst/>
+                        <a:latin typeface="arial" panose="020B0604020202020204" pitchFamily="34" charset="0"/>
+                      </a:endParaRPr>
+                    </a:p>
+                  </a:txBody>
+                  <a:tcPr marL="30614" marR="30614" marT="29389" marB="29389" anchor="ctr"/>
+                </a:tc>
+                <a:extLst>
+                  <a:ext uri="{0D108BD9-81ED-4DB2-BD59-A6C34878D82A}">
+                    <a16:rowId xmlns:a16="http://schemas.microsoft.com/office/drawing/2014/main" val="2554867080"/>
+                  </a:ext>
+                </a:extLst>
+              </a:tr>
+              <a:tr h="474671">
+                <a:tc>
+                  <a:txBody>
+                    <a:bodyPr/>
+                    <a:lstStyle/>
+                    <a:p>
+                      <a:pPr algn="ctr" rtl="0" fontAlgn="ctr">
+                        <a:spcBef>
+                          <a:spcPts val="0"/>
+                        </a:spcBef>
+                        <a:spcAft>
+                          <a:spcPts val="0"/>
+                        </a:spcAft>
+                      </a:pPr>
+                      <a:r>
+                        <a:rPr lang="pt-BR" sz="1600" dirty="0" smtClean="0">
+                          <a:effectLst/>
+                          <a:latin typeface="+mn-lt"/>
+                        </a:rPr>
+                        <a:t>2</a:t>
+                      </a:r>
+                      <a:endParaRPr lang="pt-BR" sz="1600" dirty="0">
+                        <a:effectLst/>
+                        <a:latin typeface="+mn-lt"/>
+                      </a:endParaRPr>
+                    </a:p>
+                  </a:txBody>
+                  <a:tcPr marL="30614" marR="30614" marT="29389" marB="29389" anchor="ctr"/>
+                </a:tc>
+                <a:tc>
+                  <a:txBody>
+                    <a:bodyPr/>
+                    <a:lstStyle/>
+                    <a:p>
+                      <a:pPr algn="l" rtl="0" fontAlgn="ctr">
+                        <a:spcBef>
+                          <a:spcPts val="0"/>
+                        </a:spcBef>
+                        <a:spcAft>
+                          <a:spcPts val="0"/>
+                        </a:spcAft>
+                      </a:pPr>
+                      <a:r>
+                        <a:rPr lang="pt-BR" sz="1600" dirty="0">
+                          <a:effectLst/>
+                        </a:rPr>
+                        <a:t>Manter assistente social/Manter aluno</a:t>
+                      </a:r>
+                      <a:endParaRPr lang="pt-BR" sz="1600" dirty="0">
+                        <a:effectLst/>
+                        <a:latin typeface="arial" panose="020B0604020202020204" pitchFamily="34" charset="0"/>
+                      </a:endParaRPr>
+                    </a:p>
+                  </a:txBody>
+                  <a:tcPr marL="30614" marR="30614" marT="29389" marB="29389" anchor="ctr"/>
+                </a:tc>
+                <a:tc vMerge="1">
+                  <a:txBody>
+                    <a:bodyPr/>
+                    <a:lstStyle/>
+                    <a:p>
+                      <a:endParaRPr lang="pt-BR"/>
+                    </a:p>
+                  </a:txBody>
+                  <a:tcPr/>
+                </a:tc>
+                <a:tc vMerge="1">
+                  <a:txBody>
+                    <a:bodyPr/>
+                    <a:lstStyle/>
+                    <a:p>
+                      <a:endParaRPr lang="pt-BR"/>
+                    </a:p>
+                  </a:txBody>
+                  <a:tcPr/>
+                </a:tc>
+                <a:extLst>
+                  <a:ext uri="{0D108BD9-81ED-4DB2-BD59-A6C34878D82A}">
+                    <a16:rowId xmlns:a16="http://schemas.microsoft.com/office/drawing/2014/main" val="3044483732"/>
+                  </a:ext>
+                </a:extLst>
+              </a:tr>
+              <a:tr h="270195">
+                <a:tc rowSpan="2">
+                  <a:txBody>
+                    <a:bodyPr/>
+                    <a:lstStyle/>
+                    <a:p>
+                      <a:pPr algn="ctr" rtl="0" fontAlgn="b">
+                        <a:spcBef>
+                          <a:spcPts val="0"/>
+                        </a:spcBef>
+                        <a:spcAft>
+                          <a:spcPts val="0"/>
+                        </a:spcAft>
+                      </a:pPr>
+                      <a:r>
+                        <a:rPr lang="pt-BR" sz="1600" dirty="0" smtClean="0">
+                          <a:effectLst/>
+                          <a:latin typeface="+mn-lt"/>
+                        </a:rPr>
+                        <a:t>3</a:t>
+                      </a:r>
+                      <a:endParaRPr lang="pt-BR" sz="1600" dirty="0">
+                        <a:effectLst/>
+                        <a:latin typeface="+mn-lt"/>
+                      </a:endParaRPr>
+                    </a:p>
+                  </a:txBody>
+                  <a:tcPr marL="30614" marR="30614" marT="29389" marB="29389" anchor="ctr"/>
+                </a:tc>
+                <a:tc>
+                  <a:txBody>
+                    <a:bodyPr/>
+                    <a:lstStyle/>
+                    <a:p>
+                      <a:pPr algn="l" rtl="0" fontAlgn="b">
+                        <a:spcBef>
+                          <a:spcPts val="0"/>
+                        </a:spcBef>
+                        <a:spcAft>
+                          <a:spcPts val="0"/>
+                        </a:spcAft>
+                      </a:pPr>
+                      <a:r>
+                        <a:rPr lang="pt-BR" sz="1600" dirty="0">
+                          <a:effectLst/>
+                        </a:rPr>
+                        <a:t>Manter editais de auxílios</a:t>
+                      </a:r>
+                      <a:endParaRPr lang="pt-BR" sz="1600" dirty="0">
+                        <a:effectLst/>
+                        <a:latin typeface="arial" panose="020B0604020202020204" pitchFamily="34" charset="0"/>
+                      </a:endParaRPr>
+                    </a:p>
+                  </a:txBody>
+                  <a:tcPr marL="30614" marR="30614" marT="29389" marB="29389" anchor="ctr"/>
+                </a:tc>
+                <a:tc vMerge="1">
+                  <a:txBody>
+                    <a:bodyPr/>
+                    <a:lstStyle/>
+                    <a:p>
+                      <a:endParaRPr lang="pt-BR"/>
+                    </a:p>
+                  </a:txBody>
+                  <a:tcPr/>
+                </a:tc>
+                <a:tc vMerge="1">
+                  <a:txBody>
+                    <a:bodyPr/>
+                    <a:lstStyle/>
+                    <a:p>
+                      <a:endParaRPr lang="pt-BR"/>
+                    </a:p>
+                  </a:txBody>
+                  <a:tcPr/>
+                </a:tc>
+                <a:extLst>
+                  <a:ext uri="{0D108BD9-81ED-4DB2-BD59-A6C34878D82A}">
+                    <a16:rowId xmlns:a16="http://schemas.microsoft.com/office/drawing/2014/main" val="1186335476"/>
+                  </a:ext>
+                </a:extLst>
+              </a:tr>
+              <a:tr h="474671">
+                <a:tc vMerge="1">
+                  <a:txBody>
+                    <a:bodyPr/>
+                    <a:lstStyle/>
+                    <a:p>
+                      <a:pPr algn="ctr" rtl="0" fontAlgn="b">
+                        <a:spcBef>
+                          <a:spcPts val="0"/>
+                        </a:spcBef>
+                        <a:spcAft>
+                          <a:spcPts val="0"/>
+                        </a:spcAft>
+                      </a:pPr>
+                      <a:endParaRPr lang="pt-BR" sz="1600" dirty="0">
+                        <a:effectLst/>
+                        <a:latin typeface="+mn-lt"/>
+                      </a:endParaRPr>
+                    </a:p>
+                  </a:txBody>
+                  <a:tcPr marL="30614" marR="30614" marT="29389" marB="29389" anchor="ctr"/>
+                </a:tc>
+                <a:tc>
+                  <a:txBody>
+                    <a:bodyPr/>
+                    <a:lstStyle/>
+                    <a:p>
+                      <a:pPr algn="l" rtl="0" fontAlgn="b">
+                        <a:spcBef>
+                          <a:spcPts val="0"/>
+                        </a:spcBef>
+                        <a:spcAft>
+                          <a:spcPts val="0"/>
+                        </a:spcAft>
+                      </a:pPr>
+                      <a:r>
+                        <a:rPr lang="pt-BR" sz="1600" dirty="0">
+                          <a:effectLst/>
+                        </a:rPr>
+                        <a:t>Apresentar aos alunos editais abertos</a:t>
+                      </a:r>
+                      <a:endParaRPr lang="pt-BR" sz="1600" dirty="0">
+                        <a:effectLst/>
+                        <a:latin typeface="arial" panose="020B0604020202020204" pitchFamily="34" charset="0"/>
+                      </a:endParaRPr>
+                    </a:p>
+                  </a:txBody>
+                  <a:tcPr marL="30614" marR="30614" marT="29389" marB="29389" anchor="ctr"/>
+                </a:tc>
+                <a:tc vMerge="1">
+                  <a:txBody>
+                    <a:bodyPr/>
+                    <a:lstStyle/>
+                    <a:p>
+                      <a:endParaRPr lang="pt-BR"/>
+                    </a:p>
+                  </a:txBody>
+                  <a:tcPr/>
+                </a:tc>
+                <a:tc vMerge="1">
+                  <a:txBody>
+                    <a:bodyPr/>
+                    <a:lstStyle/>
+                    <a:p>
+                      <a:endParaRPr lang="pt-BR"/>
+                    </a:p>
+                  </a:txBody>
+                  <a:tcPr/>
+                </a:tc>
+                <a:extLst>
+                  <a:ext uri="{0D108BD9-81ED-4DB2-BD59-A6C34878D82A}">
+                    <a16:rowId xmlns:a16="http://schemas.microsoft.com/office/drawing/2014/main" val="3580193233"/>
+                  </a:ext>
+                </a:extLst>
+              </a:tr>
+              <a:tr h="679147">
+                <a:tc rowSpan="3">
+                  <a:txBody>
+                    <a:bodyPr/>
+                    <a:lstStyle/>
+                    <a:p>
+                      <a:pPr algn="ctr" rtl="0" fontAlgn="b">
+                        <a:spcBef>
+                          <a:spcPts val="0"/>
+                        </a:spcBef>
+                        <a:spcAft>
+                          <a:spcPts val="0"/>
+                        </a:spcAft>
+                      </a:pPr>
+                      <a:r>
+                        <a:rPr lang="pt-BR" sz="1600" dirty="0" smtClean="0">
+                          <a:effectLst/>
+                          <a:latin typeface="+mn-lt"/>
+                        </a:rPr>
+                        <a:t>4</a:t>
+                      </a:r>
+                      <a:endParaRPr lang="pt-BR" sz="1600" dirty="0">
+                        <a:effectLst/>
+                        <a:latin typeface="+mn-lt"/>
+                      </a:endParaRPr>
+                    </a:p>
+                  </a:txBody>
+                  <a:tcPr marL="30614" marR="30614" marT="29389" marB="29389" anchor="ctr"/>
+                </a:tc>
+                <a:tc>
+                  <a:txBody>
+                    <a:bodyPr/>
+                    <a:lstStyle/>
+                    <a:p>
+                      <a:pPr algn="l" rtl="0" fontAlgn="b">
+                        <a:spcBef>
+                          <a:spcPts val="0"/>
+                        </a:spcBef>
+                        <a:spcAft>
+                          <a:spcPts val="0"/>
+                        </a:spcAft>
+                      </a:pPr>
+                      <a:r>
+                        <a:rPr lang="pt-BR" sz="1600" dirty="0">
+                          <a:effectLst/>
+                        </a:rPr>
+                        <a:t>Impedir inscrições de alunos com requisitos inválidos</a:t>
+                      </a:r>
+                      <a:endParaRPr lang="pt-BR" sz="1600" dirty="0">
+                        <a:effectLst/>
+                        <a:latin typeface="arial" panose="020B0604020202020204" pitchFamily="34" charset="0"/>
+                      </a:endParaRPr>
+                    </a:p>
+                  </a:txBody>
+                  <a:tcPr marL="30614" marR="30614" marT="29389" marB="29389" anchor="ctr"/>
+                </a:tc>
+                <a:tc vMerge="1">
+                  <a:txBody>
+                    <a:bodyPr/>
+                    <a:lstStyle/>
+                    <a:p>
+                      <a:endParaRPr lang="pt-BR"/>
+                    </a:p>
+                  </a:txBody>
+                  <a:tcPr/>
+                </a:tc>
+                <a:tc vMerge="1">
+                  <a:txBody>
+                    <a:bodyPr/>
+                    <a:lstStyle/>
+                    <a:p>
+                      <a:endParaRPr lang="pt-BR"/>
+                    </a:p>
+                  </a:txBody>
+                  <a:tcPr/>
+                </a:tc>
+                <a:extLst>
+                  <a:ext uri="{0D108BD9-81ED-4DB2-BD59-A6C34878D82A}">
+                    <a16:rowId xmlns:a16="http://schemas.microsoft.com/office/drawing/2014/main" val="1457764706"/>
+                  </a:ext>
+                </a:extLst>
+              </a:tr>
+              <a:tr h="657198">
+                <a:tc vMerge="1">
+                  <a:txBody>
+                    <a:bodyPr/>
+                    <a:lstStyle/>
+                    <a:p>
+                      <a:pPr algn="ctr" rtl="0" fontAlgn="b">
+                        <a:spcBef>
+                          <a:spcPts val="0"/>
+                        </a:spcBef>
+                        <a:spcAft>
+                          <a:spcPts val="0"/>
+                        </a:spcAft>
+                      </a:pPr>
+                      <a:endParaRPr lang="pt-BR" sz="1600" dirty="0">
+                        <a:effectLst/>
+                        <a:latin typeface="+mn-lt"/>
+                      </a:endParaRPr>
+                    </a:p>
+                  </a:txBody>
+                  <a:tcPr marL="30614" marR="30614" marT="29389" marB="29389" anchor="ctr"/>
+                </a:tc>
+                <a:tc>
+                  <a:txBody>
+                    <a:bodyPr/>
+                    <a:lstStyle/>
+                    <a:p>
+                      <a:pPr algn="l" rtl="0" fontAlgn="b">
+                        <a:spcBef>
+                          <a:spcPts val="0"/>
+                        </a:spcBef>
+                        <a:spcAft>
+                          <a:spcPts val="0"/>
+                        </a:spcAft>
+                      </a:pPr>
+                      <a:r>
+                        <a:rPr lang="pt-BR" sz="1600" dirty="0">
+                          <a:effectLst/>
+                        </a:rPr>
+                        <a:t>Apresentar o </a:t>
+                      </a:r>
+                      <a:r>
+                        <a:rPr lang="pt-BR" sz="1600" dirty="0" smtClean="0">
+                          <a:effectLst/>
+                        </a:rPr>
+                        <a:t>questionário socioeconômico </a:t>
+                      </a:r>
+                      <a:r>
+                        <a:rPr lang="pt-BR" sz="1600" dirty="0">
+                          <a:effectLst/>
+                        </a:rPr>
+                        <a:t>ao aluno</a:t>
+                      </a:r>
+                      <a:endParaRPr lang="pt-BR" sz="1600" dirty="0">
+                        <a:effectLst/>
+                        <a:latin typeface="arial" panose="020B0604020202020204" pitchFamily="34" charset="0"/>
+                      </a:endParaRPr>
+                    </a:p>
+                  </a:txBody>
+                  <a:tcPr marL="30614" marR="30614" marT="29389" marB="29389" anchor="ctr"/>
+                </a:tc>
+                <a:tc vMerge="1">
+                  <a:txBody>
+                    <a:bodyPr/>
+                    <a:lstStyle/>
+                    <a:p>
+                      <a:endParaRPr lang="pt-BR"/>
+                    </a:p>
+                  </a:txBody>
+                  <a:tcPr/>
+                </a:tc>
+                <a:tc vMerge="1">
+                  <a:txBody>
+                    <a:bodyPr/>
+                    <a:lstStyle/>
+                    <a:p>
+                      <a:endParaRPr lang="pt-BR"/>
+                    </a:p>
+                  </a:txBody>
+                  <a:tcPr/>
+                </a:tc>
+                <a:extLst>
+                  <a:ext uri="{0D108BD9-81ED-4DB2-BD59-A6C34878D82A}">
+                    <a16:rowId xmlns:a16="http://schemas.microsoft.com/office/drawing/2014/main" val="2971402635"/>
+                  </a:ext>
+                </a:extLst>
+              </a:tr>
+              <a:tr h="474671">
+                <a:tc vMerge="1">
+                  <a:txBody>
+                    <a:bodyPr/>
+                    <a:lstStyle/>
+                    <a:p>
+                      <a:pPr algn="ctr" rtl="0" fontAlgn="b">
+                        <a:spcBef>
+                          <a:spcPts val="0"/>
+                        </a:spcBef>
+                        <a:spcAft>
+                          <a:spcPts val="0"/>
+                        </a:spcAft>
+                      </a:pPr>
+                      <a:endParaRPr lang="pt-BR" sz="1600" dirty="0">
+                        <a:effectLst/>
+                        <a:latin typeface="+mn-lt"/>
+                      </a:endParaRPr>
+                    </a:p>
+                  </a:txBody>
+                  <a:tcPr marL="30614" marR="30614" marT="29389" marB="29389" anchor="ctr"/>
+                </a:tc>
+                <a:tc>
+                  <a:txBody>
+                    <a:bodyPr/>
+                    <a:lstStyle/>
+                    <a:p>
+                      <a:pPr algn="l" rtl="0" fontAlgn="b">
+                        <a:spcBef>
+                          <a:spcPts val="0"/>
+                        </a:spcBef>
+                        <a:spcAft>
+                          <a:spcPts val="0"/>
+                        </a:spcAft>
+                      </a:pPr>
+                      <a:r>
+                        <a:rPr lang="pt-BR" sz="1600" dirty="0">
+                          <a:effectLst/>
+                        </a:rPr>
+                        <a:t>Inclusão de documentos no momento da inscrição</a:t>
+                      </a:r>
+                      <a:endParaRPr lang="pt-BR" sz="1600" dirty="0">
+                        <a:effectLst/>
+                        <a:latin typeface="arial" panose="020B0604020202020204" pitchFamily="34" charset="0"/>
+                      </a:endParaRPr>
+                    </a:p>
+                  </a:txBody>
+                  <a:tcPr marL="30614" marR="30614" marT="29389" marB="29389" anchor="ctr"/>
+                </a:tc>
+                <a:tc vMerge="1">
+                  <a:txBody>
+                    <a:bodyPr/>
+                    <a:lstStyle/>
+                    <a:p>
+                      <a:endParaRPr lang="pt-BR"/>
+                    </a:p>
+                  </a:txBody>
+                  <a:tcPr/>
+                </a:tc>
+                <a:tc vMerge="1">
+                  <a:txBody>
+                    <a:bodyPr/>
+                    <a:lstStyle/>
+                    <a:p>
+                      <a:endParaRPr lang="pt-BR"/>
+                    </a:p>
+                  </a:txBody>
+                  <a:tcPr/>
+                </a:tc>
+                <a:extLst>
+                  <a:ext uri="{0D108BD9-81ED-4DB2-BD59-A6C34878D82A}">
+                    <a16:rowId xmlns:a16="http://schemas.microsoft.com/office/drawing/2014/main" val="1646859383"/>
+                  </a:ext>
+                </a:extLst>
+              </a:tr>
+              <a:tr h="237336">
+                <a:tc>
+                  <a:txBody>
+                    <a:bodyPr/>
+                    <a:lstStyle/>
+                    <a:p>
+                      <a:pPr algn="ctr" rtl="0" fontAlgn="ctr">
+                        <a:spcBef>
+                          <a:spcPts val="0"/>
+                        </a:spcBef>
+                        <a:spcAft>
+                          <a:spcPts val="0"/>
+                        </a:spcAft>
+                      </a:pPr>
+                      <a:r>
+                        <a:rPr lang="pt-BR" sz="1600" dirty="0" smtClean="0">
+                          <a:effectLst/>
+                          <a:latin typeface="+mn-lt"/>
+                        </a:rPr>
+                        <a:t>5</a:t>
+                      </a:r>
+                      <a:endParaRPr lang="pt-BR" sz="1600" dirty="0">
+                        <a:effectLst/>
+                        <a:latin typeface="+mn-lt"/>
+                      </a:endParaRPr>
+                    </a:p>
+                  </a:txBody>
+                  <a:tcPr marL="30614" marR="30614" marT="29389" marB="29389" anchor="ctr"/>
+                </a:tc>
+                <a:tc rowSpan="2">
+                  <a:txBody>
+                    <a:bodyPr/>
+                    <a:lstStyle/>
+                    <a:p>
+                      <a:pPr algn="l" rtl="0" fontAlgn="ctr">
+                        <a:spcBef>
+                          <a:spcPts val="0"/>
+                        </a:spcBef>
+                        <a:spcAft>
+                          <a:spcPts val="0"/>
+                        </a:spcAft>
+                      </a:pPr>
+                      <a:r>
+                        <a:rPr lang="pt-BR" sz="1600" dirty="0">
+                          <a:effectLst/>
+                        </a:rPr>
+                        <a:t>Pré-classificação dos alunos</a:t>
+                      </a:r>
+                      <a:endParaRPr lang="pt-BR" sz="1600" dirty="0">
+                        <a:effectLst/>
+                        <a:latin typeface="arial" panose="020B0604020202020204" pitchFamily="34" charset="0"/>
+                      </a:endParaRPr>
+                    </a:p>
+                  </a:txBody>
+                  <a:tcPr marL="30614" marR="30614" marT="29389" marB="29389" anchor="ctr"/>
+                </a:tc>
+                <a:tc vMerge="1">
+                  <a:txBody>
+                    <a:bodyPr/>
+                    <a:lstStyle/>
+                    <a:p>
+                      <a:endParaRPr lang="pt-BR"/>
+                    </a:p>
+                  </a:txBody>
+                  <a:tcPr/>
+                </a:tc>
+                <a:tc vMerge="1">
+                  <a:txBody>
+                    <a:bodyPr/>
+                    <a:lstStyle/>
+                    <a:p>
+                      <a:endParaRPr lang="pt-BR"/>
+                    </a:p>
+                  </a:txBody>
+                  <a:tcPr/>
+                </a:tc>
+                <a:extLst>
+                  <a:ext uri="{0D108BD9-81ED-4DB2-BD59-A6C34878D82A}">
+                    <a16:rowId xmlns:a16="http://schemas.microsoft.com/office/drawing/2014/main" val="1963377660"/>
+                  </a:ext>
+                </a:extLst>
+              </a:tr>
+              <a:tr h="237336">
+                <a:tc>
+                  <a:txBody>
+                    <a:bodyPr/>
+                    <a:lstStyle/>
+                    <a:p>
+                      <a:pPr algn="ctr" rtl="0" fontAlgn="ctr">
+                        <a:spcBef>
+                          <a:spcPts val="0"/>
+                        </a:spcBef>
+                        <a:spcAft>
+                          <a:spcPts val="0"/>
+                        </a:spcAft>
+                      </a:pPr>
+                      <a:r>
+                        <a:rPr lang="pt-BR" sz="1600" dirty="0" smtClean="0">
+                          <a:effectLst/>
+                          <a:latin typeface="+mn-lt"/>
+                        </a:rPr>
+                        <a:t>6</a:t>
+                      </a:r>
+                      <a:endParaRPr lang="pt-BR" sz="1600" dirty="0">
+                        <a:effectLst/>
+                        <a:latin typeface="+mn-lt"/>
+                      </a:endParaRPr>
+                    </a:p>
+                  </a:txBody>
+                  <a:tcPr marL="30614" marR="30614" marT="29389" marB="29389" anchor="ctr"/>
+                </a:tc>
+                <a:tc vMerge="1">
+                  <a:txBody>
+                    <a:bodyPr/>
+                    <a:lstStyle/>
+                    <a:p>
+                      <a:endParaRPr lang="pt-BR"/>
+                    </a:p>
+                  </a:txBody>
+                  <a:tcPr/>
+                </a:tc>
+                <a:tc vMerge="1">
+                  <a:txBody>
+                    <a:bodyPr/>
+                    <a:lstStyle/>
+                    <a:p>
+                      <a:endParaRPr lang="pt-BR"/>
+                    </a:p>
+                  </a:txBody>
+                  <a:tcPr/>
+                </a:tc>
+                <a:tc vMerge="1">
+                  <a:txBody>
+                    <a:bodyPr/>
+                    <a:lstStyle/>
+                    <a:p>
+                      <a:endParaRPr lang="pt-BR"/>
+                    </a:p>
+                  </a:txBody>
+                  <a:tcPr/>
+                </a:tc>
+                <a:extLst>
+                  <a:ext uri="{0D108BD9-81ED-4DB2-BD59-A6C34878D82A}">
+                    <a16:rowId xmlns:a16="http://schemas.microsoft.com/office/drawing/2014/main" val="2684732690"/>
+                  </a:ext>
+                </a:extLst>
+              </a:tr>
+              <a:tr h="270195">
+                <a:tc>
+                  <a:txBody>
+                    <a:bodyPr/>
+                    <a:lstStyle/>
+                    <a:p>
+                      <a:pPr algn="ctr" rtl="0" fontAlgn="b">
+                        <a:spcBef>
+                          <a:spcPts val="0"/>
+                        </a:spcBef>
+                        <a:spcAft>
+                          <a:spcPts val="0"/>
+                        </a:spcAft>
+                      </a:pPr>
+                      <a:r>
+                        <a:rPr lang="pt-BR" sz="1600" dirty="0" smtClean="0">
+                          <a:effectLst/>
+                          <a:latin typeface="+mn-lt"/>
+                        </a:rPr>
+                        <a:t>7</a:t>
+                      </a:r>
+                      <a:endParaRPr lang="pt-BR" sz="1600" dirty="0">
+                        <a:effectLst/>
+                        <a:latin typeface="+mn-lt"/>
+                      </a:endParaRPr>
+                    </a:p>
+                  </a:txBody>
+                  <a:tcPr marL="30614" marR="30614" marT="29389" marB="29389" anchor="ctr"/>
+                </a:tc>
+                <a:tc>
+                  <a:txBody>
+                    <a:bodyPr/>
+                    <a:lstStyle/>
+                    <a:p>
+                      <a:pPr algn="l" rtl="0" fontAlgn="b">
+                        <a:spcBef>
+                          <a:spcPts val="0"/>
+                        </a:spcBef>
+                        <a:spcAft>
+                          <a:spcPts val="0"/>
+                        </a:spcAft>
+                      </a:pPr>
+                      <a:r>
+                        <a:rPr lang="pt-BR" sz="1600" dirty="0">
+                          <a:effectLst/>
+                        </a:rPr>
+                        <a:t>Manter entrevistas</a:t>
+                      </a:r>
+                      <a:endParaRPr lang="pt-BR" sz="1600" dirty="0">
+                        <a:effectLst/>
+                        <a:latin typeface="arial" panose="020B0604020202020204" pitchFamily="34" charset="0"/>
+                      </a:endParaRPr>
+                    </a:p>
+                  </a:txBody>
+                  <a:tcPr marL="30614" marR="30614" marT="29389" marB="29389" anchor="ctr"/>
+                </a:tc>
+                <a:tc rowSpan="2">
+                  <a:txBody>
+                    <a:bodyPr/>
+                    <a:lstStyle/>
+                    <a:p>
+                      <a:pPr algn="ctr" rtl="0" fontAlgn="ctr">
+                        <a:spcBef>
+                          <a:spcPts val="0"/>
+                        </a:spcBef>
+                        <a:spcAft>
+                          <a:spcPts val="0"/>
+                        </a:spcAft>
+                      </a:pPr>
+                      <a:r>
+                        <a:rPr lang="pt-BR" sz="1600" dirty="0">
+                          <a:effectLst/>
+                        </a:rPr>
+                        <a:t>2</a:t>
+                      </a:r>
+                      <a:endParaRPr lang="pt-BR" sz="1600" dirty="0">
+                        <a:effectLst/>
+                        <a:latin typeface="arial" panose="020B0604020202020204" pitchFamily="34" charset="0"/>
+                      </a:endParaRPr>
+                    </a:p>
+                  </a:txBody>
+                  <a:tcPr marL="30614" marR="30614" marT="29389" marB="29389" anchor="ctr"/>
+                </a:tc>
+                <a:tc rowSpan="2">
+                  <a:txBody>
+                    <a:bodyPr/>
+                    <a:lstStyle/>
+                    <a:p>
+                      <a:pPr algn="ctr" rtl="0" fontAlgn="ctr">
+                        <a:spcBef>
+                          <a:spcPts val="0"/>
+                        </a:spcBef>
+                        <a:spcAft>
+                          <a:spcPts val="0"/>
+                        </a:spcAft>
+                      </a:pPr>
+                      <a:r>
+                        <a:rPr lang="pt-BR" sz="1600" dirty="0">
+                          <a:effectLst/>
+                        </a:rPr>
+                        <a:t>27.04.2016</a:t>
+                      </a:r>
+                      <a:endParaRPr lang="pt-BR" sz="1600" dirty="0">
+                        <a:effectLst/>
+                        <a:latin typeface="arial" panose="020B0604020202020204" pitchFamily="34" charset="0"/>
+                      </a:endParaRPr>
+                    </a:p>
+                  </a:txBody>
+                  <a:tcPr marL="30614" marR="30614" marT="29389" marB="29389" anchor="ctr"/>
+                </a:tc>
+                <a:extLst>
+                  <a:ext uri="{0D108BD9-81ED-4DB2-BD59-A6C34878D82A}">
+                    <a16:rowId xmlns:a16="http://schemas.microsoft.com/office/drawing/2014/main" val="736855547"/>
+                  </a:ext>
+                </a:extLst>
+              </a:tr>
+              <a:tr h="679147">
+                <a:tc>
+                  <a:txBody>
+                    <a:bodyPr/>
+                    <a:lstStyle/>
+                    <a:p>
+                      <a:pPr algn="ctr" rtl="0" fontAlgn="ctr">
+                        <a:spcBef>
+                          <a:spcPts val="0"/>
+                        </a:spcBef>
+                        <a:spcAft>
+                          <a:spcPts val="0"/>
+                        </a:spcAft>
+                      </a:pPr>
+                      <a:r>
+                        <a:rPr lang="pt-BR" sz="1600" dirty="0" smtClean="0">
+                          <a:effectLst/>
+                          <a:latin typeface="+mn-lt"/>
+                        </a:rPr>
+                        <a:t>8</a:t>
+                      </a:r>
+                      <a:endParaRPr lang="pt-BR" sz="1600" dirty="0">
+                        <a:effectLst/>
+                        <a:latin typeface="+mn-lt"/>
+                      </a:endParaRPr>
+                    </a:p>
+                  </a:txBody>
+                  <a:tcPr marL="30614" marR="30614" marT="29389" marB="29389" anchor="ctr"/>
+                </a:tc>
+                <a:tc>
+                  <a:txBody>
+                    <a:bodyPr/>
+                    <a:lstStyle/>
+                    <a:p>
+                      <a:pPr algn="l" rtl="0" fontAlgn="ctr">
+                        <a:spcBef>
+                          <a:spcPts val="0"/>
+                        </a:spcBef>
+                        <a:spcAft>
+                          <a:spcPts val="0"/>
+                        </a:spcAft>
+                      </a:pPr>
+                      <a:r>
+                        <a:rPr lang="pt-BR" sz="1600" dirty="0">
+                          <a:effectLst/>
+                        </a:rPr>
+                        <a:t>Manter vistas domiciliares / Gerenciar Classificação final em editais</a:t>
+                      </a:r>
+                      <a:endParaRPr lang="pt-BR" sz="1600" dirty="0">
+                        <a:effectLst/>
+                        <a:latin typeface="arial" panose="020B0604020202020204" pitchFamily="34" charset="0"/>
+                      </a:endParaRPr>
+                    </a:p>
+                  </a:txBody>
+                  <a:tcPr marL="30614" marR="30614" marT="29389" marB="29389" anchor="ctr"/>
+                </a:tc>
+                <a:tc vMerge="1">
+                  <a:txBody>
+                    <a:bodyPr/>
+                    <a:lstStyle/>
+                    <a:p>
+                      <a:endParaRPr lang="pt-BR"/>
+                    </a:p>
+                  </a:txBody>
+                  <a:tcPr/>
+                </a:tc>
+                <a:tc vMerge="1">
+                  <a:txBody>
+                    <a:bodyPr/>
+                    <a:lstStyle/>
+                    <a:p>
+                      <a:endParaRPr lang="pt-BR"/>
+                    </a:p>
+                  </a:txBody>
+                  <a:tcPr/>
+                </a:tc>
+                <a:extLst>
+                  <a:ext uri="{0D108BD9-81ED-4DB2-BD59-A6C34878D82A}">
+                    <a16:rowId xmlns:a16="http://schemas.microsoft.com/office/drawing/2014/main" val="967817576"/>
+                  </a:ext>
+                </a:extLst>
+              </a:tr>
+            </a:tbl>
+          </a:graphicData>
+        </a:graphic>
+      </p:graphicFrame>
     </p:spTree>
     <p:extLst>
       <p:ext uri="{BB962C8B-B14F-4D97-AF65-F5344CB8AC3E}">
@@ -5299,6 +6256,13 @@
   <p:clrMapOvr>
     <a:masterClrMapping/>
   </p:clrMapOvr>
+  <p:timing>
+    <p:tnLst>
+      <p:par>
+        <p:cTn id="1" dur="indefinite" restart="never" nodeType="tmRoot"/>
+      </p:par>
+    </p:tnLst>
+  </p:timing>
 </p:sld>
 </file>
 
@@ -5435,6 +6399,13 @@
   <p:clrMapOvr>
     <a:masterClrMapping/>
   </p:clrMapOvr>
+  <p:timing>
+    <p:tnLst>
+      <p:par>
+        <p:cTn id="1" dur="indefinite" restart="never" nodeType="tmRoot"/>
+      </p:par>
+    </p:tnLst>
+  </p:timing>
 </p:sld>
 </file>
 
@@ -5543,6 +6514,13 @@
   <p:clrMapOvr>
     <a:masterClrMapping/>
   </p:clrMapOvr>
+  <p:timing>
+    <p:tnLst>
+      <p:par>
+        <p:cTn id="1" dur="indefinite" restart="never" nodeType="tmRoot"/>
+      </p:par>
+    </p:tnLst>
+  </p:timing>
 </p:sld>
 </file>
 
@@ -5586,81 +6564,370 @@
           </a:p>
         </p:txBody>
       </p:sp>
-      <p:sp>
-        <p:nvSpPr>
-          <p:cNvPr id="3" name="Content Placeholder 2"/>
-          <p:cNvSpPr>
-            <a:spLocks noGrp="1"/>
-          </p:cNvSpPr>
+      <p:graphicFrame>
+        <p:nvGraphicFramePr>
+          <p:cNvPr id="4" name="Espaço Reservado para Conteúdo 3"/>
+          <p:cNvGraphicFramePr>
+            <a:graphicFrameLocks noGrp="1"/>
+          </p:cNvGraphicFramePr>
           <p:nvPr>
             <p:ph idx="1"/>
+            <p:extLst>
+              <p:ext uri="{D42A27DB-BD31-4B8C-83A1-F6EECF244321}">
+                <p14:modId xmlns:p14="http://schemas.microsoft.com/office/powerpoint/2010/main" val="1156440414"/>
+              </p:ext>
+            </p:extLst>
           </p:nvPr>
-        </p:nvSpPr>
-        <p:spPr/>
-        <p:txBody>
-          <a:bodyPr/>
-          <a:lstStyle/>
-          <a:p>
-            <a:r>
-              <a:rPr lang="en-US" dirty="0" smtClean="0"/>
-              <a:t>&lt;&lt;</a:t>
-            </a:r>
-            <a:r>
-              <a:rPr lang="en-US" dirty="0" err="1" smtClean="0"/>
-              <a:t>Descrever</a:t>
-            </a:r>
-            <a:r>
-              <a:rPr lang="en-US" dirty="0" smtClean="0"/>
-              <a:t> </a:t>
-            </a:r>
-            <a:r>
-              <a:rPr lang="en-US" dirty="0" err="1" smtClean="0"/>
-              <a:t>os</a:t>
-            </a:r>
-            <a:r>
-              <a:rPr lang="en-US" dirty="0" smtClean="0"/>
-              <a:t> </a:t>
-            </a:r>
-            <a:r>
-              <a:rPr lang="en-US" dirty="0" err="1" smtClean="0"/>
-              <a:t>riscos</a:t>
-            </a:r>
-            <a:r>
-              <a:rPr lang="en-US" dirty="0" smtClean="0"/>
-              <a:t> do </a:t>
-            </a:r>
-            <a:r>
-              <a:rPr lang="en-US" dirty="0" err="1" smtClean="0"/>
-              <a:t>projeto</a:t>
-            </a:r>
-            <a:r>
-              <a:rPr lang="en-US" dirty="0" smtClean="0"/>
-              <a:t>. </a:t>
-            </a:r>
-            <a:r>
-              <a:rPr lang="en-US" dirty="0" err="1" smtClean="0"/>
-              <a:t>Risco</a:t>
-            </a:r>
-            <a:r>
-              <a:rPr lang="en-US" dirty="0" smtClean="0"/>
-              <a:t> é </a:t>
-            </a:r>
-            <a:r>
-              <a:rPr lang="pt-BR" dirty="0" smtClean="0"/>
-              <a:t>um </a:t>
-            </a:r>
-            <a:r>
-              <a:rPr lang="pt-BR" dirty="0"/>
-              <a:t>evento ou condição incerta que, se ocorrer, provocará um efeito positivo ou negativo nos objetivos de um projeto</a:t>
-            </a:r>
-            <a:r>
-              <a:rPr lang="pt-BR" dirty="0" smtClean="0"/>
-              <a:t>.&gt;&gt;</a:t>
-            </a:r>
-            <a:endParaRPr lang="pt-BR" dirty="0"/>
-          </a:p>
-        </p:txBody>
-      </p:sp>
+        </p:nvGraphicFramePr>
+        <p:xfrm>
+          <a:off x="457200" y="1420838"/>
+          <a:ext cx="8229600" cy="5080600"/>
+        </p:xfrm>
+        <a:graphic>
+          <a:graphicData uri="http://schemas.openxmlformats.org/drawingml/2006/table">
+            <a:tbl>
+              <a:tblPr firstRow="1" bandRow="1">
+                <a:tableStyleId>{073A0DAA-6AF3-43AB-8588-CEC1D06C72B9}</a:tableStyleId>
+              </a:tblPr>
+              <a:tblGrid>
+                <a:gridCol w="2818656">
+                  <a:extLst>
+                    <a:ext uri="{9D8B030D-6E8A-4147-A177-3AD203B41FA5}">
+                      <a16:colId xmlns:a16="http://schemas.microsoft.com/office/drawing/2014/main" val="3698253761"/>
+                    </a:ext>
+                  </a:extLst>
+                </a:gridCol>
+                <a:gridCol w="5410944">
+                  <a:extLst>
+                    <a:ext uri="{9D8B030D-6E8A-4147-A177-3AD203B41FA5}">
+                      <a16:colId xmlns:a16="http://schemas.microsoft.com/office/drawing/2014/main" val="1250542102"/>
+                    </a:ext>
+                  </a:extLst>
+                </a:gridCol>
+              </a:tblGrid>
+              <a:tr h="725800">
+                <a:tc>
+                  <a:txBody>
+                    <a:bodyPr/>
+                    <a:lstStyle/>
+                    <a:p>
+                      <a:pPr algn="ctr"/>
+                      <a:r>
+                        <a:rPr lang="pt-BR" sz="2400" b="0" dirty="0" smtClean="0"/>
+                        <a:t>Descrição de Risco</a:t>
+                      </a:r>
+                      <a:endParaRPr lang="pt-BR" sz="2400" b="0" dirty="0"/>
+                    </a:p>
+                  </a:txBody>
+                  <a:tcPr anchor="ctr"/>
+                </a:tc>
+                <a:tc>
+                  <a:txBody>
+                    <a:bodyPr/>
+                    <a:lstStyle/>
+                    <a:p>
+                      <a:pPr algn="ctr"/>
+                      <a:r>
+                        <a:rPr lang="pt-BR" sz="2400" b="0" dirty="0" smtClean="0"/>
+                        <a:t>Efeito</a:t>
+                      </a:r>
+                      <a:endParaRPr lang="pt-BR" sz="2400" b="0" dirty="0"/>
+                    </a:p>
+                  </a:txBody>
+                  <a:tcPr anchor="ctr"/>
+                </a:tc>
+                <a:extLst>
+                  <a:ext uri="{0D108BD9-81ED-4DB2-BD59-A6C34878D82A}">
+                    <a16:rowId xmlns:a16="http://schemas.microsoft.com/office/drawing/2014/main" val="3539930694"/>
+                  </a:ext>
+                </a:extLst>
+              </a:tr>
+              <a:tr h="725800">
+                <a:tc>
+                  <a:txBody>
+                    <a:bodyPr/>
+                    <a:lstStyle/>
+                    <a:p>
+                      <a:pPr algn="l" fontAlgn="ctr"/>
+                      <a:r>
+                        <a:rPr lang="pt-BR" sz="1800" b="0" i="0" u="none" strike="noStrike" dirty="0">
+                          <a:solidFill>
+                            <a:schemeClr val="tx1"/>
+                          </a:solidFill>
+                          <a:effectLst/>
+                          <a:latin typeface="Calibri" panose="020F0502020204030204" pitchFamily="34" charset="0"/>
+                        </a:rPr>
+                        <a:t>Negativo</a:t>
+                      </a:r>
+                    </a:p>
+                  </a:txBody>
+                  <a:tcPr marL="0" marR="0" marT="0" marB="0" anchor="ctr"/>
+                </a:tc>
+                <a:tc>
+                  <a:txBody>
+                    <a:bodyPr/>
+                    <a:lstStyle/>
+                    <a:p>
+                      <a:pPr algn="l" fontAlgn="ctr"/>
+                      <a:r>
+                        <a:rPr lang="pt-BR" sz="1800" b="0" i="0" u="none" strike="noStrike">
+                          <a:solidFill>
+                            <a:schemeClr val="tx1"/>
+                          </a:solidFill>
+                          <a:effectLst/>
+                          <a:latin typeface="Calibri" panose="020F0502020204030204" pitchFamily="34" charset="0"/>
+                        </a:rPr>
+                        <a:t>Atraso em Finalização de Iteração</a:t>
+                      </a:r>
+                    </a:p>
+                  </a:txBody>
+                  <a:tcPr marL="0" marR="0" marT="0" marB="0" anchor="ctr"/>
+                </a:tc>
+                <a:extLst>
+                  <a:ext uri="{0D108BD9-81ED-4DB2-BD59-A6C34878D82A}">
+                    <a16:rowId xmlns:a16="http://schemas.microsoft.com/office/drawing/2014/main" val="607310417"/>
+                  </a:ext>
+                </a:extLst>
+              </a:tr>
+              <a:tr h="725800">
+                <a:tc>
+                  <a:txBody>
+                    <a:bodyPr/>
+                    <a:lstStyle/>
+                    <a:p>
+                      <a:pPr algn="l" fontAlgn="ctr"/>
+                      <a:r>
+                        <a:rPr lang="pt-BR" sz="1800" b="0" i="0" u="none" strike="noStrike" dirty="0">
+                          <a:solidFill>
+                            <a:schemeClr val="tx1"/>
+                          </a:solidFill>
+                          <a:effectLst/>
+                          <a:latin typeface="Calibri" panose="020F0502020204030204" pitchFamily="34" charset="0"/>
+                        </a:rPr>
+                        <a:t>Negativo</a:t>
+                      </a:r>
+                    </a:p>
+                  </a:txBody>
+                  <a:tcPr marL="0" marR="0" marT="0" marB="0" anchor="ctr"/>
+                </a:tc>
+                <a:tc>
+                  <a:txBody>
+                    <a:bodyPr/>
+                    <a:lstStyle/>
+                    <a:p>
+                      <a:pPr algn="l" fontAlgn="ctr"/>
+                      <a:r>
+                        <a:rPr lang="pt-BR" sz="1800" b="0" i="0" u="none" strike="noStrike">
+                          <a:solidFill>
+                            <a:schemeClr val="tx1"/>
+                          </a:solidFill>
+                          <a:effectLst/>
+                          <a:latin typeface="Calibri" panose="020F0502020204030204" pitchFamily="34" charset="0"/>
+                        </a:rPr>
+                        <a:t>Falha do Planejamento Inicial do Projeto</a:t>
+                      </a:r>
+                    </a:p>
+                  </a:txBody>
+                  <a:tcPr marL="0" marR="0" marT="0" marB="0" anchor="ctr"/>
+                </a:tc>
+                <a:extLst>
+                  <a:ext uri="{0D108BD9-81ED-4DB2-BD59-A6C34878D82A}">
+                    <a16:rowId xmlns:a16="http://schemas.microsoft.com/office/drawing/2014/main" val="2579143061"/>
+                  </a:ext>
+                </a:extLst>
+              </a:tr>
+              <a:tr h="725800">
+                <a:tc>
+                  <a:txBody>
+                    <a:bodyPr/>
+                    <a:lstStyle/>
+                    <a:p>
+                      <a:pPr algn="l" fontAlgn="ctr"/>
+                      <a:r>
+                        <a:rPr lang="pt-BR" sz="1800" b="0" i="0" u="none" strike="noStrike" dirty="0">
+                          <a:solidFill>
+                            <a:schemeClr val="tx1"/>
+                          </a:solidFill>
+                          <a:effectLst/>
+                          <a:latin typeface="Calibri" panose="020F0502020204030204" pitchFamily="34" charset="0"/>
+                        </a:rPr>
+                        <a:t>Negativo</a:t>
+                      </a:r>
+                    </a:p>
+                  </a:txBody>
+                  <a:tcPr marL="0" marR="0" marT="0" marB="0" anchor="ctr"/>
+                </a:tc>
+                <a:tc>
+                  <a:txBody>
+                    <a:bodyPr/>
+                    <a:lstStyle/>
+                    <a:p>
+                      <a:pPr algn="l" fontAlgn="ctr"/>
+                      <a:r>
+                        <a:rPr lang="pt-BR" sz="1800" b="0" i="0" u="none" strike="noStrike">
+                          <a:solidFill>
+                            <a:schemeClr val="tx1"/>
+                          </a:solidFill>
+                          <a:effectLst/>
+                          <a:latin typeface="Calibri" panose="020F0502020204030204" pitchFamily="34" charset="0"/>
+                        </a:rPr>
+                        <a:t>Má Distribuição de Tempo nas Atividades da Iteração</a:t>
+                      </a:r>
+                    </a:p>
+                  </a:txBody>
+                  <a:tcPr marL="0" marR="0" marT="0" marB="0" anchor="ctr"/>
+                </a:tc>
+                <a:extLst>
+                  <a:ext uri="{0D108BD9-81ED-4DB2-BD59-A6C34878D82A}">
+                    <a16:rowId xmlns:a16="http://schemas.microsoft.com/office/drawing/2014/main" val="3789935278"/>
+                  </a:ext>
+                </a:extLst>
+              </a:tr>
+              <a:tr h="725800">
+                <a:tc>
+                  <a:txBody>
+                    <a:bodyPr/>
+                    <a:lstStyle/>
+                    <a:p>
+                      <a:pPr algn="l" fontAlgn="ctr"/>
+                      <a:r>
+                        <a:rPr lang="pt-BR" sz="1800" b="0" i="0" u="none" strike="noStrike" dirty="0">
+                          <a:solidFill>
+                            <a:schemeClr val="tx1"/>
+                          </a:solidFill>
+                          <a:effectLst/>
+                          <a:latin typeface="Calibri" panose="020F0502020204030204" pitchFamily="34" charset="0"/>
+                        </a:rPr>
+                        <a:t>Negativo</a:t>
+                      </a:r>
+                    </a:p>
+                  </a:txBody>
+                  <a:tcPr marL="0" marR="0" marT="0" marB="0" anchor="ctr"/>
+                </a:tc>
+                <a:tc>
+                  <a:txBody>
+                    <a:bodyPr/>
+                    <a:lstStyle/>
+                    <a:p>
+                      <a:pPr algn="l" fontAlgn="ctr"/>
+                      <a:r>
+                        <a:rPr lang="pt-BR" sz="1800" b="0" i="0" u="none" strike="noStrike">
+                          <a:solidFill>
+                            <a:schemeClr val="tx1"/>
+                          </a:solidFill>
+                          <a:effectLst/>
+                          <a:latin typeface="Calibri" panose="020F0502020204030204" pitchFamily="34" charset="0"/>
+                        </a:rPr>
+                        <a:t>Análise de Riscos Incompleta</a:t>
+                      </a:r>
+                    </a:p>
+                  </a:txBody>
+                  <a:tcPr marL="0" marR="0" marT="0" marB="0" anchor="ctr"/>
+                </a:tc>
+                <a:extLst>
+                  <a:ext uri="{0D108BD9-81ED-4DB2-BD59-A6C34878D82A}">
+                    <a16:rowId xmlns:a16="http://schemas.microsoft.com/office/drawing/2014/main" val="2279244280"/>
+                  </a:ext>
+                </a:extLst>
+              </a:tr>
+              <a:tr h="725800">
+                <a:tc>
+                  <a:txBody>
+                    <a:bodyPr/>
+                    <a:lstStyle/>
+                    <a:p>
+                      <a:pPr algn="l" fontAlgn="ctr"/>
+                      <a:r>
+                        <a:rPr lang="pt-BR" sz="1800" b="0" i="0" u="none" strike="noStrike" dirty="0">
+                          <a:solidFill>
+                            <a:schemeClr val="tx1"/>
+                          </a:solidFill>
+                          <a:effectLst/>
+                          <a:latin typeface="Calibri" panose="020F0502020204030204" pitchFamily="34" charset="0"/>
+                        </a:rPr>
+                        <a:t>Negativo</a:t>
+                      </a:r>
+                    </a:p>
+                  </a:txBody>
+                  <a:tcPr marL="0" marR="0" marT="0" marB="0" anchor="ctr"/>
+                </a:tc>
+                <a:tc>
+                  <a:txBody>
+                    <a:bodyPr/>
+                    <a:lstStyle/>
+                    <a:p>
+                      <a:pPr algn="l" fontAlgn="ctr"/>
+                      <a:r>
+                        <a:rPr lang="pt-BR" sz="1800" b="0" i="0" u="none" strike="noStrike" dirty="0">
+                          <a:solidFill>
+                            <a:schemeClr val="tx1"/>
+                          </a:solidFill>
+                          <a:effectLst/>
+                          <a:latin typeface="Calibri" panose="020F0502020204030204" pitchFamily="34" charset="0"/>
+                        </a:rPr>
+                        <a:t>Testes Realizados Parcialmente em Release de Iteração</a:t>
+                      </a:r>
+                    </a:p>
+                  </a:txBody>
+                  <a:tcPr marL="0" marR="0" marT="0" marB="0" anchor="ctr"/>
+                </a:tc>
+                <a:extLst>
+                  <a:ext uri="{0D108BD9-81ED-4DB2-BD59-A6C34878D82A}">
+                    <a16:rowId xmlns:a16="http://schemas.microsoft.com/office/drawing/2014/main" val="738068903"/>
+                  </a:ext>
+                </a:extLst>
+              </a:tr>
+              <a:tr h="725800">
+                <a:tc>
+                  <a:txBody>
+                    <a:bodyPr/>
+                    <a:lstStyle/>
+                    <a:p>
+                      <a:pPr algn="l" fontAlgn="ctr"/>
+                      <a:r>
+                        <a:rPr lang="pt-BR" sz="1800" b="0" i="0" u="none" strike="noStrike">
+                          <a:solidFill>
+                            <a:schemeClr val="tx1"/>
+                          </a:solidFill>
+                          <a:effectLst/>
+                          <a:latin typeface="Calibri" panose="020F0502020204030204" pitchFamily="34" charset="0"/>
+                        </a:rPr>
+                        <a:t>Negativo</a:t>
+                      </a:r>
+                    </a:p>
+                  </a:txBody>
+                  <a:tcPr marL="0" marR="0" marT="0" marB="0" anchor="ctr"/>
+                </a:tc>
+                <a:tc>
+                  <a:txBody>
+                    <a:bodyPr/>
+                    <a:lstStyle/>
+                    <a:p>
+                      <a:pPr algn="l" fontAlgn="ctr"/>
+                      <a:r>
+                        <a:rPr lang="pt-BR" sz="1800" b="0" i="0" u="none" strike="noStrike" dirty="0">
+                          <a:solidFill>
+                            <a:schemeClr val="tx1"/>
+                          </a:solidFill>
+                          <a:effectLst/>
+                          <a:latin typeface="Calibri" panose="020F0502020204030204" pitchFamily="34" charset="0"/>
+                        </a:rPr>
+                        <a:t>Recursos (Hardware e Softwares) Indisponíveis</a:t>
+                      </a:r>
+                    </a:p>
+                  </a:txBody>
+                  <a:tcPr marL="0" marR="0" marT="0" marB="0" anchor="ctr"/>
+                </a:tc>
+                <a:extLst>
+                  <a:ext uri="{0D108BD9-81ED-4DB2-BD59-A6C34878D82A}">
+                    <a16:rowId xmlns:a16="http://schemas.microsoft.com/office/drawing/2014/main" val="910536462"/>
+                  </a:ext>
+                </a:extLst>
+              </a:tr>
+            </a:tbl>
+          </a:graphicData>
+        </a:graphic>
+      </p:graphicFrame>
     </p:spTree>
     <p:extLst>
       <p:ext uri="{BB962C8B-B14F-4D97-AF65-F5344CB8AC3E}">
@@ -5671,6 +6938,861 @@
   <p:clrMapOvr>
     <a:masterClrMapping/>
   </p:clrMapOvr>
+  <p:timing>
+    <p:tnLst>
+      <p:par>
+        <p:cTn id="1" dur="indefinite" restart="never" nodeType="tmRoot"/>
+      </p:par>
+    </p:tnLst>
+  </p:timing>
+</p:sld>
+</file>
+
+<file path=ppt/slides/slide18.xml><?xml version="1.0" encoding="utf-8"?>
+<p:sld xmlns:a="http://schemas.openxmlformats.org/drawingml/2006/main" xmlns:r="http://schemas.openxmlformats.org/officeDocument/2006/relationships" xmlns:p="http://schemas.openxmlformats.org/presentationml/2006/main">
+  <p:cSld>
+    <p:spTree>
+      <p:nvGrpSpPr>
+        <p:cNvPr id="1" name=""/>
+        <p:cNvGrpSpPr/>
+        <p:nvPr/>
+      </p:nvGrpSpPr>
+      <p:grpSpPr>
+        <a:xfrm>
+          <a:off x="0" y="0"/>
+          <a:ext cx="0" cy="0"/>
+          <a:chOff x="0" y="0"/>
+          <a:chExt cx="0" cy="0"/>
+        </a:xfrm>
+      </p:grpSpPr>
+      <p:sp>
+        <p:nvSpPr>
+          <p:cNvPr id="2" name="Title 1"/>
+          <p:cNvSpPr>
+            <a:spLocks noGrp="1"/>
+          </p:cNvSpPr>
+          <p:nvPr>
+            <p:ph type="title"/>
+          </p:nvPr>
+        </p:nvSpPr>
+        <p:spPr/>
+        <p:txBody>
+          <a:bodyPr/>
+          <a:lstStyle/>
+          <a:p>
+            <a:r>
+              <a:rPr lang="en-US" dirty="0" err="1" smtClean="0"/>
+              <a:t>Riscos</a:t>
+            </a:r>
+            <a:endParaRPr lang="pt-BR" dirty="0"/>
+          </a:p>
+        </p:txBody>
+      </p:sp>
+      <p:graphicFrame>
+        <p:nvGraphicFramePr>
+          <p:cNvPr id="4" name="Espaço Reservado para Conteúdo 3"/>
+          <p:cNvGraphicFramePr>
+            <a:graphicFrameLocks noGrp="1"/>
+          </p:cNvGraphicFramePr>
+          <p:nvPr>
+            <p:ph idx="1"/>
+            <p:extLst>
+              <p:ext uri="{D42A27DB-BD31-4B8C-83A1-F6EECF244321}">
+                <p14:modId xmlns:p14="http://schemas.microsoft.com/office/powerpoint/2010/main" val="1156440414"/>
+              </p:ext>
+            </p:extLst>
+          </p:nvPr>
+        </p:nvGraphicFramePr>
+        <p:xfrm>
+          <a:off x="457200" y="1420838"/>
+          <a:ext cx="8229600" cy="5080600"/>
+        </p:xfrm>
+        <a:graphic>
+          <a:graphicData uri="http://schemas.openxmlformats.org/drawingml/2006/table">
+            <a:tbl>
+              <a:tblPr firstRow="1" bandRow="1">
+                <a:tableStyleId>{073A0DAA-6AF3-43AB-8588-CEC1D06C72B9}</a:tableStyleId>
+              </a:tblPr>
+              <a:tblGrid>
+                <a:gridCol w="2818656">
+                  <a:extLst>
+                    <a:ext uri="{9D8B030D-6E8A-4147-A177-3AD203B41FA5}">
+                      <a16:colId xmlns:a16="http://schemas.microsoft.com/office/drawing/2014/main" val="3698253761"/>
+                    </a:ext>
+                  </a:extLst>
+                </a:gridCol>
+                <a:gridCol w="5410944">
+                  <a:extLst>
+                    <a:ext uri="{9D8B030D-6E8A-4147-A177-3AD203B41FA5}">
+                      <a16:colId xmlns:a16="http://schemas.microsoft.com/office/drawing/2014/main" val="1250542102"/>
+                    </a:ext>
+                  </a:extLst>
+                </a:gridCol>
+              </a:tblGrid>
+              <a:tr h="725800">
+                <a:tc>
+                  <a:txBody>
+                    <a:bodyPr/>
+                    <a:lstStyle/>
+                    <a:p>
+                      <a:pPr algn="ctr"/>
+                      <a:r>
+                        <a:rPr lang="pt-BR" sz="2400" b="0" dirty="0" smtClean="0"/>
+                        <a:t>Descrição de Risco</a:t>
+                      </a:r>
+                      <a:endParaRPr lang="pt-BR" sz="2400" b="0" dirty="0"/>
+                    </a:p>
+                  </a:txBody>
+                  <a:tcPr anchor="ctr"/>
+                </a:tc>
+                <a:tc>
+                  <a:txBody>
+                    <a:bodyPr/>
+                    <a:lstStyle/>
+                    <a:p>
+                      <a:pPr algn="ctr"/>
+                      <a:r>
+                        <a:rPr lang="pt-BR" sz="2400" b="0" dirty="0" smtClean="0"/>
+                        <a:t>Efeito</a:t>
+                      </a:r>
+                      <a:endParaRPr lang="pt-BR" sz="2400" b="0" dirty="0"/>
+                    </a:p>
+                  </a:txBody>
+                  <a:tcPr anchor="ctr"/>
+                </a:tc>
+                <a:extLst>
+                  <a:ext uri="{0D108BD9-81ED-4DB2-BD59-A6C34878D82A}">
+                    <a16:rowId xmlns:a16="http://schemas.microsoft.com/office/drawing/2014/main" val="3539930694"/>
+                  </a:ext>
+                </a:extLst>
+              </a:tr>
+              <a:tr h="725800">
+                <a:tc>
+                  <a:txBody>
+                    <a:bodyPr/>
+                    <a:lstStyle/>
+                    <a:p>
+                      <a:pPr algn="l" fontAlgn="ctr"/>
+                      <a:r>
+                        <a:rPr lang="pt-BR" sz="1800" b="0" i="0" u="none" strike="noStrike" dirty="0">
+                          <a:solidFill>
+                            <a:schemeClr val="tx1"/>
+                          </a:solidFill>
+                          <a:effectLst/>
+                          <a:latin typeface="Calibri" panose="020F0502020204030204" pitchFamily="34" charset="0"/>
+                        </a:rPr>
+                        <a:t>Negativo</a:t>
+                      </a:r>
+                    </a:p>
+                  </a:txBody>
+                  <a:tcPr marL="0" marR="0" marT="0" marB="0" anchor="ctr"/>
+                </a:tc>
+                <a:tc>
+                  <a:txBody>
+                    <a:bodyPr/>
+                    <a:lstStyle/>
+                    <a:p>
+                      <a:pPr algn="l" fontAlgn="ctr"/>
+                      <a:r>
+                        <a:rPr lang="pt-BR" sz="1800" b="0" i="0" u="none" strike="noStrike" dirty="0">
+                          <a:solidFill>
+                            <a:schemeClr val="tx1"/>
+                          </a:solidFill>
+                          <a:effectLst/>
+                          <a:latin typeface="Calibri" panose="020F0502020204030204" pitchFamily="34" charset="0"/>
+                        </a:rPr>
+                        <a:t>Surgimento de Bugs em Release Disponibilizada ao Cliente</a:t>
+                      </a:r>
+                    </a:p>
+                  </a:txBody>
+                  <a:tcPr marL="0" marR="0" marT="0" marB="0" anchor="ctr"/>
+                </a:tc>
+                <a:extLst>
+                  <a:ext uri="{0D108BD9-81ED-4DB2-BD59-A6C34878D82A}">
+                    <a16:rowId xmlns:a16="http://schemas.microsoft.com/office/drawing/2014/main" val="607310417"/>
+                  </a:ext>
+                </a:extLst>
+              </a:tr>
+              <a:tr h="725800">
+                <a:tc>
+                  <a:txBody>
+                    <a:bodyPr/>
+                    <a:lstStyle/>
+                    <a:p>
+                      <a:pPr algn="l" fontAlgn="ctr"/>
+                      <a:r>
+                        <a:rPr lang="pt-BR" sz="1800" b="0" i="0" u="none" strike="noStrike">
+                          <a:solidFill>
+                            <a:schemeClr val="tx1"/>
+                          </a:solidFill>
+                          <a:effectLst/>
+                          <a:latin typeface="Calibri" panose="020F0502020204030204" pitchFamily="34" charset="0"/>
+                        </a:rPr>
+                        <a:t>Negativo</a:t>
+                      </a:r>
+                    </a:p>
+                  </a:txBody>
+                  <a:tcPr marL="0" marR="0" marT="0" marB="0" anchor="ctr"/>
+                </a:tc>
+                <a:tc>
+                  <a:txBody>
+                    <a:bodyPr/>
+                    <a:lstStyle/>
+                    <a:p>
+                      <a:pPr algn="l" fontAlgn="ctr"/>
+                      <a:r>
+                        <a:rPr lang="pt-BR" sz="1800" b="0" i="0" u="none" strike="noStrike" dirty="0">
+                          <a:solidFill>
+                            <a:schemeClr val="tx1"/>
+                          </a:solidFill>
+                          <a:effectLst/>
+                          <a:latin typeface="Calibri" panose="020F0502020204030204" pitchFamily="34" charset="0"/>
+                        </a:rPr>
+                        <a:t>Indisponibilidade dos Clientes</a:t>
+                      </a:r>
+                    </a:p>
+                  </a:txBody>
+                  <a:tcPr marL="0" marR="0" marT="0" marB="0" anchor="ctr"/>
+                </a:tc>
+                <a:extLst>
+                  <a:ext uri="{0D108BD9-81ED-4DB2-BD59-A6C34878D82A}">
+                    <a16:rowId xmlns:a16="http://schemas.microsoft.com/office/drawing/2014/main" val="2579143061"/>
+                  </a:ext>
+                </a:extLst>
+              </a:tr>
+              <a:tr h="725800">
+                <a:tc>
+                  <a:txBody>
+                    <a:bodyPr/>
+                    <a:lstStyle/>
+                    <a:p>
+                      <a:pPr algn="l" fontAlgn="ctr"/>
+                      <a:r>
+                        <a:rPr lang="pt-BR" sz="1800" b="0" i="0" u="none" strike="noStrike">
+                          <a:solidFill>
+                            <a:schemeClr val="tx1"/>
+                          </a:solidFill>
+                          <a:effectLst/>
+                          <a:latin typeface="Calibri" panose="020F0502020204030204" pitchFamily="34" charset="0"/>
+                        </a:rPr>
+                        <a:t>Negativo</a:t>
+                      </a:r>
+                    </a:p>
+                  </a:txBody>
+                  <a:tcPr marL="0" marR="0" marT="0" marB="0" anchor="ctr"/>
+                </a:tc>
+                <a:tc>
+                  <a:txBody>
+                    <a:bodyPr/>
+                    <a:lstStyle/>
+                    <a:p>
+                      <a:pPr algn="l" fontAlgn="ctr"/>
+                      <a:r>
+                        <a:rPr lang="pt-BR" sz="1800" b="0" i="0" u="none" strike="noStrike" dirty="0">
+                          <a:solidFill>
+                            <a:schemeClr val="tx1"/>
+                          </a:solidFill>
+                          <a:effectLst/>
+                          <a:latin typeface="Calibri" panose="020F0502020204030204" pitchFamily="34" charset="0"/>
+                        </a:rPr>
+                        <a:t>Adição de Novos Requisitos</a:t>
+                      </a:r>
+                    </a:p>
+                  </a:txBody>
+                  <a:tcPr marL="0" marR="0" marT="0" marB="0" anchor="ctr"/>
+                </a:tc>
+                <a:extLst>
+                  <a:ext uri="{0D108BD9-81ED-4DB2-BD59-A6C34878D82A}">
+                    <a16:rowId xmlns:a16="http://schemas.microsoft.com/office/drawing/2014/main" val="3789935278"/>
+                  </a:ext>
+                </a:extLst>
+              </a:tr>
+              <a:tr h="725800">
+                <a:tc>
+                  <a:txBody>
+                    <a:bodyPr/>
+                    <a:lstStyle/>
+                    <a:p>
+                      <a:pPr algn="l" fontAlgn="ctr"/>
+                      <a:r>
+                        <a:rPr lang="pt-BR" sz="1800" b="0" i="0" u="none" strike="noStrike">
+                          <a:solidFill>
+                            <a:schemeClr val="tx1"/>
+                          </a:solidFill>
+                          <a:effectLst/>
+                          <a:latin typeface="Calibri" panose="020F0502020204030204" pitchFamily="34" charset="0"/>
+                        </a:rPr>
+                        <a:t>Negativo</a:t>
+                      </a:r>
+                    </a:p>
+                  </a:txBody>
+                  <a:tcPr marL="0" marR="0" marT="0" marB="0" anchor="ctr"/>
+                </a:tc>
+                <a:tc>
+                  <a:txBody>
+                    <a:bodyPr/>
+                    <a:lstStyle/>
+                    <a:p>
+                      <a:pPr algn="l" fontAlgn="ctr"/>
+                      <a:r>
+                        <a:rPr lang="pt-BR" sz="1800" b="0" i="0" u="none" strike="noStrike" dirty="0">
+                          <a:solidFill>
+                            <a:schemeClr val="tx1"/>
+                          </a:solidFill>
+                          <a:effectLst/>
+                          <a:latin typeface="Calibri" panose="020F0502020204030204" pitchFamily="34" charset="0"/>
+                        </a:rPr>
+                        <a:t>Mudança em Requisitos</a:t>
+                      </a:r>
+                    </a:p>
+                  </a:txBody>
+                  <a:tcPr marL="0" marR="0" marT="0" marB="0" anchor="ctr"/>
+                </a:tc>
+                <a:extLst>
+                  <a:ext uri="{0D108BD9-81ED-4DB2-BD59-A6C34878D82A}">
+                    <a16:rowId xmlns:a16="http://schemas.microsoft.com/office/drawing/2014/main" val="2279244280"/>
+                  </a:ext>
+                </a:extLst>
+              </a:tr>
+              <a:tr h="725800">
+                <a:tc>
+                  <a:txBody>
+                    <a:bodyPr/>
+                    <a:lstStyle/>
+                    <a:p>
+                      <a:pPr algn="l" fontAlgn="ctr"/>
+                      <a:r>
+                        <a:rPr lang="pt-BR" sz="1800" b="0" i="0" u="none" strike="noStrike">
+                          <a:solidFill>
+                            <a:schemeClr val="tx1"/>
+                          </a:solidFill>
+                          <a:effectLst/>
+                          <a:latin typeface="Calibri" panose="020F0502020204030204" pitchFamily="34" charset="0"/>
+                        </a:rPr>
+                        <a:t>Negativo</a:t>
+                      </a:r>
+                    </a:p>
+                  </a:txBody>
+                  <a:tcPr marL="0" marR="0" marT="0" marB="0" anchor="ctr"/>
+                </a:tc>
+                <a:tc>
+                  <a:txBody>
+                    <a:bodyPr/>
+                    <a:lstStyle/>
+                    <a:p>
+                      <a:pPr algn="l" fontAlgn="ctr"/>
+                      <a:r>
+                        <a:rPr lang="pt-BR" sz="1800" b="0" i="0" u="none" strike="noStrike" dirty="0">
+                          <a:solidFill>
+                            <a:schemeClr val="tx1"/>
+                          </a:solidFill>
+                          <a:effectLst/>
+                          <a:latin typeface="Calibri" panose="020F0502020204030204" pitchFamily="34" charset="0"/>
+                        </a:rPr>
+                        <a:t>Necessidade de Utilização para Nova Tecnologia não Planejada pela Equipe</a:t>
+                      </a:r>
+                    </a:p>
+                  </a:txBody>
+                  <a:tcPr marL="0" marR="0" marT="0" marB="0" anchor="ctr"/>
+                </a:tc>
+                <a:extLst>
+                  <a:ext uri="{0D108BD9-81ED-4DB2-BD59-A6C34878D82A}">
+                    <a16:rowId xmlns:a16="http://schemas.microsoft.com/office/drawing/2014/main" val="738068903"/>
+                  </a:ext>
+                </a:extLst>
+              </a:tr>
+              <a:tr h="725800">
+                <a:tc>
+                  <a:txBody>
+                    <a:bodyPr/>
+                    <a:lstStyle/>
+                    <a:p>
+                      <a:pPr algn="l" fontAlgn="ctr"/>
+                      <a:r>
+                        <a:rPr lang="pt-BR" sz="1800" b="0" i="0" u="none" strike="noStrike">
+                          <a:solidFill>
+                            <a:schemeClr val="tx1"/>
+                          </a:solidFill>
+                          <a:effectLst/>
+                          <a:latin typeface="Calibri" panose="020F0502020204030204" pitchFamily="34" charset="0"/>
+                        </a:rPr>
+                        <a:t>Negativo</a:t>
+                      </a:r>
+                    </a:p>
+                  </a:txBody>
+                  <a:tcPr marL="0" marR="0" marT="0" marB="0" anchor="ctr"/>
+                </a:tc>
+                <a:tc>
+                  <a:txBody>
+                    <a:bodyPr/>
+                    <a:lstStyle/>
+                    <a:p>
+                      <a:pPr algn="l" fontAlgn="b"/>
+                      <a:r>
+                        <a:rPr lang="pt-BR" sz="1800" b="0" i="0" u="none" strike="noStrike" dirty="0">
+                          <a:solidFill>
+                            <a:schemeClr val="tx1"/>
+                          </a:solidFill>
+                          <a:effectLst/>
+                          <a:latin typeface="Calibri" panose="020F0502020204030204" pitchFamily="34" charset="0"/>
+                        </a:rPr>
+                        <a:t>Dificuldade na Utilização de alguma Tecnologia pela Equipe</a:t>
+                      </a:r>
+                    </a:p>
+                  </a:txBody>
+                  <a:tcPr marL="0" marR="0" marT="0" marB="0" anchor="b"/>
+                </a:tc>
+                <a:extLst>
+                  <a:ext uri="{0D108BD9-81ED-4DB2-BD59-A6C34878D82A}">
+                    <a16:rowId xmlns:a16="http://schemas.microsoft.com/office/drawing/2014/main" val="910536462"/>
+                  </a:ext>
+                </a:extLst>
+              </a:tr>
+            </a:tbl>
+          </a:graphicData>
+        </a:graphic>
+      </p:graphicFrame>
+    </p:spTree>
+    <p:extLst>
+      <p:ext uri="{BB962C8B-B14F-4D97-AF65-F5344CB8AC3E}">
+        <p14:creationId xmlns:p14="http://schemas.microsoft.com/office/powerpoint/2010/main" val="810545065"/>
+      </p:ext>
+    </p:extLst>
+  </p:cSld>
+  <p:clrMapOvr>
+    <a:masterClrMapping/>
+  </p:clrMapOvr>
+  <p:timing>
+    <p:tnLst>
+      <p:par>
+        <p:cTn id="1" dur="indefinite" restart="never" nodeType="tmRoot"/>
+      </p:par>
+    </p:tnLst>
+  </p:timing>
+</p:sld>
+</file>
+
+<file path=ppt/slides/slide19.xml><?xml version="1.0" encoding="utf-8"?>
+<p:sld xmlns:a="http://schemas.openxmlformats.org/drawingml/2006/main" xmlns:r="http://schemas.openxmlformats.org/officeDocument/2006/relationships" xmlns:p="http://schemas.openxmlformats.org/presentationml/2006/main">
+  <p:cSld>
+    <p:spTree>
+      <p:nvGrpSpPr>
+        <p:cNvPr id="1" name=""/>
+        <p:cNvGrpSpPr/>
+        <p:nvPr/>
+      </p:nvGrpSpPr>
+      <p:grpSpPr>
+        <a:xfrm>
+          <a:off x="0" y="0"/>
+          <a:ext cx="0" cy="0"/>
+          <a:chOff x="0" y="0"/>
+          <a:chExt cx="0" cy="0"/>
+        </a:xfrm>
+      </p:grpSpPr>
+      <p:sp>
+        <p:nvSpPr>
+          <p:cNvPr id="2" name="Title 1"/>
+          <p:cNvSpPr>
+            <a:spLocks noGrp="1"/>
+          </p:cNvSpPr>
+          <p:nvPr>
+            <p:ph type="title"/>
+          </p:nvPr>
+        </p:nvSpPr>
+        <p:spPr/>
+        <p:txBody>
+          <a:bodyPr/>
+          <a:lstStyle/>
+          <a:p>
+            <a:r>
+              <a:rPr lang="en-US" dirty="0" err="1" smtClean="0"/>
+              <a:t>Riscos</a:t>
+            </a:r>
+            <a:endParaRPr lang="pt-BR" dirty="0"/>
+          </a:p>
+        </p:txBody>
+      </p:sp>
+      <p:graphicFrame>
+        <p:nvGraphicFramePr>
+          <p:cNvPr id="4" name="Espaço Reservado para Conteúdo 3"/>
+          <p:cNvGraphicFramePr>
+            <a:graphicFrameLocks noGrp="1"/>
+          </p:cNvGraphicFramePr>
+          <p:nvPr>
+            <p:ph idx="1"/>
+            <p:extLst>
+              <p:ext uri="{D42A27DB-BD31-4B8C-83A1-F6EECF244321}">
+                <p14:modId xmlns:p14="http://schemas.microsoft.com/office/powerpoint/2010/main" val="1789347474"/>
+              </p:ext>
+            </p:extLst>
+          </p:nvPr>
+        </p:nvGraphicFramePr>
+        <p:xfrm>
+          <a:off x="457200" y="1420838"/>
+          <a:ext cx="8229600" cy="5080600"/>
+        </p:xfrm>
+        <a:graphic>
+          <a:graphicData uri="http://schemas.openxmlformats.org/drawingml/2006/table">
+            <a:tbl>
+              <a:tblPr firstRow="1" bandRow="1">
+                <a:tableStyleId>{073A0DAA-6AF3-43AB-8588-CEC1D06C72B9}</a:tableStyleId>
+              </a:tblPr>
+              <a:tblGrid>
+                <a:gridCol w="2818656">
+                  <a:extLst>
+                    <a:ext uri="{9D8B030D-6E8A-4147-A177-3AD203B41FA5}">
+                      <a16:colId xmlns:a16="http://schemas.microsoft.com/office/drawing/2014/main" val="3698253761"/>
+                    </a:ext>
+                  </a:extLst>
+                </a:gridCol>
+                <a:gridCol w="5410944">
+                  <a:extLst>
+                    <a:ext uri="{9D8B030D-6E8A-4147-A177-3AD203B41FA5}">
+                      <a16:colId xmlns:a16="http://schemas.microsoft.com/office/drawing/2014/main" val="1250542102"/>
+                    </a:ext>
+                  </a:extLst>
+                </a:gridCol>
+              </a:tblGrid>
+              <a:tr h="725800">
+                <a:tc>
+                  <a:txBody>
+                    <a:bodyPr/>
+                    <a:lstStyle/>
+                    <a:p>
+                      <a:pPr algn="ctr"/>
+                      <a:r>
+                        <a:rPr lang="pt-BR" sz="2400" b="0" dirty="0" smtClean="0"/>
+                        <a:t>Descrição de Risco</a:t>
+                      </a:r>
+                      <a:endParaRPr lang="pt-BR" sz="2400" b="0" dirty="0"/>
+                    </a:p>
+                  </a:txBody>
+                  <a:tcPr anchor="ctr"/>
+                </a:tc>
+                <a:tc>
+                  <a:txBody>
+                    <a:bodyPr/>
+                    <a:lstStyle/>
+                    <a:p>
+                      <a:pPr algn="ctr"/>
+                      <a:r>
+                        <a:rPr lang="pt-BR" sz="2400" b="0" dirty="0" smtClean="0"/>
+                        <a:t>Efeito</a:t>
+                      </a:r>
+                      <a:endParaRPr lang="pt-BR" sz="2400" b="0" dirty="0"/>
+                    </a:p>
+                  </a:txBody>
+                  <a:tcPr anchor="ctr"/>
+                </a:tc>
+                <a:extLst>
+                  <a:ext uri="{0D108BD9-81ED-4DB2-BD59-A6C34878D82A}">
+                    <a16:rowId xmlns:a16="http://schemas.microsoft.com/office/drawing/2014/main" val="3539930694"/>
+                  </a:ext>
+                </a:extLst>
+              </a:tr>
+              <a:tr h="725800">
+                <a:tc>
+                  <a:txBody>
+                    <a:bodyPr/>
+                    <a:lstStyle/>
+                    <a:p>
+                      <a:pPr algn="l" fontAlgn="ctr"/>
+                      <a:r>
+                        <a:rPr lang="pt-BR" sz="1800" b="0" i="0" u="none" strike="noStrike">
+                          <a:solidFill>
+                            <a:schemeClr val="tx1"/>
+                          </a:solidFill>
+                          <a:effectLst/>
+                          <a:latin typeface="Calibri" panose="020F0502020204030204" pitchFamily="34" charset="0"/>
+                        </a:rPr>
+                        <a:t>Negativo</a:t>
+                      </a:r>
+                    </a:p>
+                  </a:txBody>
+                  <a:tcPr marL="0" marR="0" marT="0" marB="0" anchor="ctr"/>
+                </a:tc>
+                <a:tc>
+                  <a:txBody>
+                    <a:bodyPr/>
+                    <a:lstStyle/>
+                    <a:p>
+                      <a:pPr algn="l" fontAlgn="ctr"/>
+                      <a:r>
+                        <a:rPr lang="pt-BR" sz="1800" b="0" i="0" u="none" strike="noStrike">
+                          <a:solidFill>
+                            <a:schemeClr val="tx1"/>
+                          </a:solidFill>
+                          <a:effectLst/>
+                          <a:latin typeface="Calibri" panose="020F0502020204030204" pitchFamily="34" charset="0"/>
+                        </a:rPr>
+                        <a:t>Afastamento de Membro de Equipe por Viagem a Congressos, Concursos e etc.</a:t>
+                      </a:r>
+                    </a:p>
+                  </a:txBody>
+                  <a:tcPr marL="0" marR="0" marT="0" marB="0" anchor="ctr"/>
+                </a:tc>
+                <a:extLst>
+                  <a:ext uri="{0D108BD9-81ED-4DB2-BD59-A6C34878D82A}">
+                    <a16:rowId xmlns:a16="http://schemas.microsoft.com/office/drawing/2014/main" val="607310417"/>
+                  </a:ext>
+                </a:extLst>
+              </a:tr>
+              <a:tr h="725800">
+                <a:tc>
+                  <a:txBody>
+                    <a:bodyPr/>
+                    <a:lstStyle/>
+                    <a:p>
+                      <a:pPr algn="l" fontAlgn="ctr"/>
+                      <a:r>
+                        <a:rPr lang="pt-BR" sz="1800" b="0" i="0" u="none" strike="noStrike">
+                          <a:solidFill>
+                            <a:schemeClr val="tx1"/>
+                          </a:solidFill>
+                          <a:effectLst/>
+                          <a:latin typeface="Calibri" panose="020F0502020204030204" pitchFamily="34" charset="0"/>
+                        </a:rPr>
+                        <a:t>Negativo</a:t>
+                      </a:r>
+                    </a:p>
+                  </a:txBody>
+                  <a:tcPr marL="0" marR="0" marT="0" marB="0" anchor="ctr"/>
+                </a:tc>
+                <a:tc>
+                  <a:txBody>
+                    <a:bodyPr/>
+                    <a:lstStyle/>
+                    <a:p>
+                      <a:pPr algn="l" fontAlgn="ctr"/>
+                      <a:r>
+                        <a:rPr lang="pt-BR" sz="1800" b="0" i="0" u="none" strike="noStrike">
+                          <a:solidFill>
+                            <a:schemeClr val="tx1"/>
+                          </a:solidFill>
+                          <a:effectLst/>
+                          <a:latin typeface="Calibri" panose="020F0502020204030204" pitchFamily="34" charset="0"/>
+                        </a:rPr>
+                        <a:t>Afastamento de Membro de Equipe por Motivos de Saúde</a:t>
+                      </a:r>
+                    </a:p>
+                  </a:txBody>
+                  <a:tcPr marL="0" marR="0" marT="0" marB="0" anchor="ctr"/>
+                </a:tc>
+                <a:extLst>
+                  <a:ext uri="{0D108BD9-81ED-4DB2-BD59-A6C34878D82A}">
+                    <a16:rowId xmlns:a16="http://schemas.microsoft.com/office/drawing/2014/main" val="2579143061"/>
+                  </a:ext>
+                </a:extLst>
+              </a:tr>
+              <a:tr h="725800">
+                <a:tc>
+                  <a:txBody>
+                    <a:bodyPr/>
+                    <a:lstStyle/>
+                    <a:p>
+                      <a:pPr algn="l" fontAlgn="ctr"/>
+                      <a:r>
+                        <a:rPr lang="pt-BR" sz="1800" b="0" i="0" u="none" strike="noStrike">
+                          <a:solidFill>
+                            <a:schemeClr val="tx1"/>
+                          </a:solidFill>
+                          <a:effectLst/>
+                          <a:latin typeface="Calibri" panose="020F0502020204030204" pitchFamily="34" charset="0"/>
+                        </a:rPr>
+                        <a:t>Negativo</a:t>
+                      </a:r>
+                    </a:p>
+                  </a:txBody>
+                  <a:tcPr marL="0" marR="0" marT="0" marB="0" anchor="ctr"/>
+                </a:tc>
+                <a:tc>
+                  <a:txBody>
+                    <a:bodyPr/>
+                    <a:lstStyle/>
+                    <a:p>
+                      <a:pPr algn="l" fontAlgn="ctr"/>
+                      <a:r>
+                        <a:rPr lang="pt-BR" sz="1800" b="0" i="0" u="none" strike="noStrike">
+                          <a:solidFill>
+                            <a:schemeClr val="tx1"/>
+                          </a:solidFill>
+                          <a:effectLst/>
+                          <a:latin typeface="Calibri" panose="020F0502020204030204" pitchFamily="34" charset="0"/>
+                        </a:rPr>
+                        <a:t>Dificuldade de Comunicação entre Membros de Equipe</a:t>
+                      </a:r>
+                    </a:p>
+                  </a:txBody>
+                  <a:tcPr marL="0" marR="0" marT="0" marB="0" anchor="ctr"/>
+                </a:tc>
+                <a:extLst>
+                  <a:ext uri="{0D108BD9-81ED-4DB2-BD59-A6C34878D82A}">
+                    <a16:rowId xmlns:a16="http://schemas.microsoft.com/office/drawing/2014/main" val="3789935278"/>
+                  </a:ext>
+                </a:extLst>
+              </a:tr>
+              <a:tr h="725800">
+                <a:tc>
+                  <a:txBody>
+                    <a:bodyPr/>
+                    <a:lstStyle/>
+                    <a:p>
+                      <a:pPr algn="l" fontAlgn="ctr"/>
+                      <a:r>
+                        <a:rPr lang="pt-BR" sz="1800" b="0" i="0" u="none" strike="noStrike">
+                          <a:solidFill>
+                            <a:schemeClr val="tx1"/>
+                          </a:solidFill>
+                          <a:effectLst/>
+                          <a:latin typeface="Calibri" panose="020F0502020204030204" pitchFamily="34" charset="0"/>
+                        </a:rPr>
+                        <a:t>Negativo</a:t>
+                      </a:r>
+                    </a:p>
+                  </a:txBody>
+                  <a:tcPr marL="0" marR="0" marT="0" marB="0" anchor="ctr"/>
+                </a:tc>
+                <a:tc>
+                  <a:txBody>
+                    <a:bodyPr/>
+                    <a:lstStyle/>
+                    <a:p>
+                      <a:pPr algn="l" fontAlgn="ctr"/>
+                      <a:r>
+                        <a:rPr lang="pt-BR" sz="1800" b="0" i="0" u="none" strike="noStrike">
+                          <a:solidFill>
+                            <a:schemeClr val="tx1"/>
+                          </a:solidFill>
+                          <a:effectLst/>
+                          <a:latin typeface="Calibri" panose="020F0502020204030204" pitchFamily="34" charset="0"/>
+                        </a:rPr>
+                        <a:t>Desistência de um Membro da Equipe</a:t>
+                      </a:r>
+                    </a:p>
+                  </a:txBody>
+                  <a:tcPr marL="0" marR="0" marT="0" marB="0" anchor="ctr"/>
+                </a:tc>
+                <a:extLst>
+                  <a:ext uri="{0D108BD9-81ED-4DB2-BD59-A6C34878D82A}">
+                    <a16:rowId xmlns:a16="http://schemas.microsoft.com/office/drawing/2014/main" val="2279244280"/>
+                  </a:ext>
+                </a:extLst>
+              </a:tr>
+              <a:tr h="725800">
+                <a:tc>
+                  <a:txBody>
+                    <a:bodyPr/>
+                    <a:lstStyle/>
+                    <a:p>
+                      <a:pPr algn="l" fontAlgn="ctr"/>
+                      <a:r>
+                        <a:rPr lang="pt-BR" sz="1800" b="0" i="0" u="none" strike="noStrike">
+                          <a:solidFill>
+                            <a:schemeClr val="tx1"/>
+                          </a:solidFill>
+                          <a:effectLst/>
+                          <a:latin typeface="Calibri" panose="020F0502020204030204" pitchFamily="34" charset="0"/>
+                        </a:rPr>
+                        <a:t>Negativo</a:t>
+                      </a:r>
+                    </a:p>
+                  </a:txBody>
+                  <a:tcPr marL="0" marR="0" marT="0" marB="0" anchor="ctr"/>
+                </a:tc>
+                <a:tc>
+                  <a:txBody>
+                    <a:bodyPr/>
+                    <a:lstStyle/>
+                    <a:p>
+                      <a:pPr algn="l" fontAlgn="ctr"/>
+                      <a:r>
+                        <a:rPr lang="pt-BR" sz="1800" b="0" i="0" u="none" strike="noStrike">
+                          <a:solidFill>
+                            <a:schemeClr val="tx1"/>
+                          </a:solidFill>
+                          <a:effectLst/>
+                          <a:latin typeface="Calibri" panose="020F0502020204030204" pitchFamily="34" charset="0"/>
+                        </a:rPr>
+                        <a:t>Dificuldade no Acesso ao Sistema Acadêmico do IFPB - Campus Monteiro</a:t>
+                      </a:r>
+                    </a:p>
+                  </a:txBody>
+                  <a:tcPr marL="0" marR="0" marT="0" marB="0" anchor="ctr"/>
+                </a:tc>
+                <a:extLst>
+                  <a:ext uri="{0D108BD9-81ED-4DB2-BD59-A6C34878D82A}">
+                    <a16:rowId xmlns:a16="http://schemas.microsoft.com/office/drawing/2014/main" val="738068903"/>
+                  </a:ext>
+                </a:extLst>
+              </a:tr>
+              <a:tr h="725800">
+                <a:tc>
+                  <a:txBody>
+                    <a:bodyPr/>
+                    <a:lstStyle/>
+                    <a:p>
+                      <a:pPr algn="l" fontAlgn="ctr"/>
+                      <a:r>
+                        <a:rPr lang="pt-BR" sz="1800" b="0" i="0" u="none" strike="noStrike">
+                          <a:solidFill>
+                            <a:schemeClr val="tx1"/>
+                          </a:solidFill>
+                          <a:effectLst/>
+                          <a:latin typeface="Calibri" panose="020F0502020204030204" pitchFamily="34" charset="0"/>
+                        </a:rPr>
+                        <a:t>Negativo</a:t>
+                      </a:r>
+                    </a:p>
+                  </a:txBody>
+                  <a:tcPr marL="0" marR="0" marT="0" marB="0" anchor="ctr"/>
+                </a:tc>
+                <a:tc>
+                  <a:txBody>
+                    <a:bodyPr/>
+                    <a:lstStyle/>
+                    <a:p>
+                      <a:pPr algn="l" fontAlgn="ctr"/>
+                      <a:r>
+                        <a:rPr lang="pt-BR" sz="1800" b="0" i="0" u="none" strike="noStrike" dirty="0">
+                          <a:solidFill>
+                            <a:schemeClr val="tx1"/>
+                          </a:solidFill>
+                          <a:effectLst/>
+                          <a:latin typeface="Calibri" panose="020F0502020204030204" pitchFamily="34" charset="0"/>
+                        </a:rPr>
+                        <a:t>Dificuldade no Acesso a Plataforma SUAP</a:t>
+                      </a:r>
+                    </a:p>
+                  </a:txBody>
+                  <a:tcPr marL="0" marR="0" marT="0" marB="0" anchor="ctr"/>
+                </a:tc>
+                <a:extLst>
+                  <a:ext uri="{0D108BD9-81ED-4DB2-BD59-A6C34878D82A}">
+                    <a16:rowId xmlns:a16="http://schemas.microsoft.com/office/drawing/2014/main" val="910536462"/>
+                  </a:ext>
+                </a:extLst>
+              </a:tr>
+            </a:tbl>
+          </a:graphicData>
+        </a:graphic>
+      </p:graphicFrame>
+    </p:spTree>
+    <p:extLst>
+      <p:ext uri="{BB962C8B-B14F-4D97-AF65-F5344CB8AC3E}">
+        <p14:creationId xmlns:p14="http://schemas.microsoft.com/office/powerpoint/2010/main" val="3787596196"/>
+      </p:ext>
+    </p:extLst>
+  </p:cSld>
+  <p:clrMapOvr>
+    <a:masterClrMapping/>
+  </p:clrMapOvr>
+  <p:timing>
+    <p:tnLst>
+      <p:par>
+        <p:cTn id="1" dur="indefinite" restart="never" nodeType="tmRoot"/>
+      </p:par>
+    </p:tnLst>
+  </p:timing>
 </p:sld>
 </file>
 
@@ -5820,6 +7942,266 @@
   <p:clrMapOvr>
     <a:masterClrMapping/>
   </p:clrMapOvr>
+  <p:timing>
+    <p:tnLst>
+      <p:par>
+        <p:cTn id="1" dur="indefinite" restart="never" nodeType="tmRoot"/>
+      </p:par>
+    </p:tnLst>
+  </p:timing>
+</p:sld>
+</file>
+
+<file path=ppt/slides/slide20.xml><?xml version="1.0" encoding="utf-8"?>
+<p:sld xmlns:a="http://schemas.openxmlformats.org/drawingml/2006/main" xmlns:r="http://schemas.openxmlformats.org/officeDocument/2006/relationships" xmlns:p="http://schemas.openxmlformats.org/presentationml/2006/main">
+  <p:cSld>
+    <p:spTree>
+      <p:nvGrpSpPr>
+        <p:cNvPr id="1" name=""/>
+        <p:cNvGrpSpPr/>
+        <p:nvPr/>
+      </p:nvGrpSpPr>
+      <p:grpSpPr>
+        <a:xfrm>
+          <a:off x="0" y="0"/>
+          <a:ext cx="0" cy="0"/>
+          <a:chOff x="0" y="0"/>
+          <a:chExt cx="0" cy="0"/>
+        </a:xfrm>
+      </p:grpSpPr>
+      <p:sp>
+        <p:nvSpPr>
+          <p:cNvPr id="2" name="Title 1"/>
+          <p:cNvSpPr>
+            <a:spLocks noGrp="1"/>
+          </p:cNvSpPr>
+          <p:nvPr>
+            <p:ph type="title"/>
+          </p:nvPr>
+        </p:nvSpPr>
+        <p:spPr/>
+        <p:txBody>
+          <a:bodyPr/>
+          <a:lstStyle/>
+          <a:p>
+            <a:r>
+              <a:rPr lang="en-US" dirty="0" err="1" smtClean="0"/>
+              <a:t>Riscos</a:t>
+            </a:r>
+            <a:endParaRPr lang="pt-BR" dirty="0"/>
+          </a:p>
+        </p:txBody>
+      </p:sp>
+      <p:graphicFrame>
+        <p:nvGraphicFramePr>
+          <p:cNvPr id="4" name="Espaço Reservado para Conteúdo 3"/>
+          <p:cNvGraphicFramePr>
+            <a:graphicFrameLocks noGrp="1"/>
+          </p:cNvGraphicFramePr>
+          <p:nvPr>
+            <p:ph idx="1"/>
+            <p:extLst>
+              <p:ext uri="{D42A27DB-BD31-4B8C-83A1-F6EECF244321}">
+                <p14:modId xmlns:p14="http://schemas.microsoft.com/office/powerpoint/2010/main" val="2355938862"/>
+              </p:ext>
+            </p:extLst>
+          </p:nvPr>
+        </p:nvGraphicFramePr>
+        <p:xfrm>
+          <a:off x="457200" y="2564904"/>
+          <a:ext cx="8229600" cy="2177400"/>
+        </p:xfrm>
+        <a:graphic>
+          <a:graphicData uri="http://schemas.openxmlformats.org/drawingml/2006/table">
+            <a:tbl>
+              <a:tblPr firstRow="1" bandRow="1">
+                <a:tableStyleId>{073A0DAA-6AF3-43AB-8588-CEC1D06C72B9}</a:tableStyleId>
+              </a:tblPr>
+              <a:tblGrid>
+                <a:gridCol w="2818656">
+                  <a:extLst>
+                    <a:ext uri="{9D8B030D-6E8A-4147-A177-3AD203B41FA5}">
+                      <a16:colId xmlns:a16="http://schemas.microsoft.com/office/drawing/2014/main" val="3698253761"/>
+                    </a:ext>
+                  </a:extLst>
+                </a:gridCol>
+                <a:gridCol w="5410944">
+                  <a:extLst>
+                    <a:ext uri="{9D8B030D-6E8A-4147-A177-3AD203B41FA5}">
+                      <a16:colId xmlns:a16="http://schemas.microsoft.com/office/drawing/2014/main" val="1250542102"/>
+                    </a:ext>
+                  </a:extLst>
+                </a:gridCol>
+              </a:tblGrid>
+              <a:tr h="725800">
+                <a:tc>
+                  <a:txBody>
+                    <a:bodyPr/>
+                    <a:lstStyle/>
+                    <a:p>
+                      <a:pPr algn="ctr"/>
+                      <a:r>
+                        <a:rPr lang="pt-BR" sz="2400" b="0" dirty="0" smtClean="0"/>
+                        <a:t>Descrição de Risco</a:t>
+                      </a:r>
+                      <a:endParaRPr lang="pt-BR" sz="2400" b="0" dirty="0"/>
+                    </a:p>
+                  </a:txBody>
+                  <a:tcPr anchor="ctr"/>
+                </a:tc>
+                <a:tc>
+                  <a:txBody>
+                    <a:bodyPr/>
+                    <a:lstStyle/>
+                    <a:p>
+                      <a:pPr algn="ctr"/>
+                      <a:r>
+                        <a:rPr lang="pt-BR" sz="2400" b="0" dirty="0" smtClean="0"/>
+                        <a:t>Efeito</a:t>
+                      </a:r>
+                      <a:endParaRPr lang="pt-BR" sz="2400" b="0" dirty="0"/>
+                    </a:p>
+                  </a:txBody>
+                  <a:tcPr anchor="ctr"/>
+                </a:tc>
+                <a:extLst>
+                  <a:ext uri="{0D108BD9-81ED-4DB2-BD59-A6C34878D82A}">
+                    <a16:rowId xmlns:a16="http://schemas.microsoft.com/office/drawing/2014/main" val="3539930694"/>
+                  </a:ext>
+                </a:extLst>
+              </a:tr>
+              <a:tr h="725800">
+                <a:tc>
+                  <a:txBody>
+                    <a:bodyPr/>
+                    <a:lstStyle/>
+                    <a:p>
+                      <a:pPr algn="l" fontAlgn="ctr"/>
+                      <a:r>
+                        <a:rPr lang="pt-BR" sz="1800" b="0" i="0" u="none" strike="noStrike">
+                          <a:solidFill>
+                            <a:schemeClr val="tx1"/>
+                          </a:solidFill>
+                          <a:effectLst/>
+                          <a:latin typeface="Calibri" panose="020F0502020204030204" pitchFamily="34" charset="0"/>
+                        </a:rPr>
+                        <a:t>Negativo</a:t>
+                      </a:r>
+                    </a:p>
+                  </a:txBody>
+                  <a:tcPr marL="0" marR="0" marT="0" marB="0" anchor="ctr"/>
+                </a:tc>
+                <a:tc>
+                  <a:txBody>
+                    <a:bodyPr/>
+                    <a:lstStyle/>
+                    <a:p>
+                      <a:pPr algn="l" fontAlgn="ctr"/>
+                      <a:r>
+                        <a:rPr lang="pt-BR" sz="1800" b="0" i="0" u="none" strike="noStrike">
+                          <a:solidFill>
+                            <a:schemeClr val="tx1"/>
+                          </a:solidFill>
+                          <a:effectLst/>
+                          <a:latin typeface="Calibri" panose="020F0502020204030204" pitchFamily="34" charset="0"/>
+                        </a:rPr>
+                        <a:t>Dificuldade no Acesso ao IceScrum</a:t>
+                      </a:r>
+                    </a:p>
+                  </a:txBody>
+                  <a:tcPr marL="0" marR="0" marT="0" marB="0" anchor="ctr"/>
+                </a:tc>
+                <a:extLst>
+                  <a:ext uri="{0D108BD9-81ED-4DB2-BD59-A6C34878D82A}">
+                    <a16:rowId xmlns:a16="http://schemas.microsoft.com/office/drawing/2014/main" val="607310417"/>
+                  </a:ext>
+                </a:extLst>
+              </a:tr>
+              <a:tr h="725800">
+                <a:tc>
+                  <a:txBody>
+                    <a:bodyPr/>
+                    <a:lstStyle/>
+                    <a:p>
+                      <a:pPr algn="l" fontAlgn="ctr"/>
+                      <a:r>
+                        <a:rPr lang="pt-BR" sz="1800" b="0" i="0" u="none" strike="noStrike">
+                          <a:solidFill>
+                            <a:schemeClr val="tx1"/>
+                          </a:solidFill>
+                          <a:effectLst/>
+                          <a:latin typeface="Calibri" panose="020F0502020204030204" pitchFamily="34" charset="0"/>
+                        </a:rPr>
+                        <a:t>Negativo</a:t>
+                      </a:r>
+                    </a:p>
+                  </a:txBody>
+                  <a:tcPr marL="0" marR="0" marT="0" marB="0" anchor="ctr"/>
+                </a:tc>
+                <a:tc>
+                  <a:txBody>
+                    <a:bodyPr/>
+                    <a:lstStyle/>
+                    <a:p>
+                      <a:pPr algn="l" fontAlgn="ctr"/>
+                      <a:r>
+                        <a:rPr lang="pt-BR" sz="1800" b="0" i="0" u="none" strike="noStrike" dirty="0">
+                          <a:solidFill>
+                            <a:schemeClr val="tx1"/>
+                          </a:solidFill>
+                          <a:effectLst/>
+                          <a:latin typeface="Calibri" panose="020F0502020204030204" pitchFamily="34" charset="0"/>
+                        </a:rPr>
+                        <a:t>Dificuldade no Acesso ao </a:t>
+                      </a:r>
+                      <a:r>
+                        <a:rPr lang="pt-BR" sz="1800" b="0" i="0" u="none" strike="noStrike" dirty="0" err="1">
+                          <a:solidFill>
+                            <a:schemeClr val="tx1"/>
+                          </a:solidFill>
+                          <a:effectLst/>
+                          <a:latin typeface="Calibri" panose="020F0502020204030204" pitchFamily="34" charset="0"/>
+                        </a:rPr>
+                        <a:t>Jenkis</a:t>
+                      </a:r>
+                      <a:endParaRPr lang="pt-BR" sz="1800" b="0" i="0" u="none" strike="noStrike" dirty="0">
+                        <a:solidFill>
+                          <a:schemeClr val="tx1"/>
+                        </a:solidFill>
+                        <a:effectLst/>
+                        <a:latin typeface="Calibri" panose="020F0502020204030204" pitchFamily="34" charset="0"/>
+                      </a:endParaRPr>
+                    </a:p>
+                  </a:txBody>
+                  <a:tcPr marL="0" marR="0" marT="0" marB="0" anchor="ctr"/>
+                </a:tc>
+                <a:extLst>
+                  <a:ext uri="{0D108BD9-81ED-4DB2-BD59-A6C34878D82A}">
+                    <a16:rowId xmlns:a16="http://schemas.microsoft.com/office/drawing/2014/main" val="2579143061"/>
+                  </a:ext>
+                </a:extLst>
+              </a:tr>
+            </a:tbl>
+          </a:graphicData>
+        </a:graphic>
+      </p:graphicFrame>
+    </p:spTree>
+    <p:extLst>
+      <p:ext uri="{BB962C8B-B14F-4D97-AF65-F5344CB8AC3E}">
+        <p14:creationId xmlns:p14="http://schemas.microsoft.com/office/powerpoint/2010/main" val="2017759038"/>
+      </p:ext>
+    </p:extLst>
+  </p:cSld>
+  <p:clrMapOvr>
+    <a:masterClrMapping/>
+  </p:clrMapOvr>
+  <p:timing>
+    <p:tnLst>
+      <p:par>
+        <p:cTn id="1" dur="indefinite" restart="never" nodeType="tmRoot"/>
+      </p:par>
+    </p:tnLst>
+  </p:timing>
 </p:sld>
 </file>
 

</xml_diff>

<commit_message>
Versão 0.3 PPJ e Versão 1.0 de PBL
</commit_message>
<xml_diff>
--- a/02-PROJETO-2015.2/01-GERENCIA DE PROJETO/PPJ-Plano de Projeto.pptx
+++ b/02-PROJETO-2015.2/01-GERENCIA DE PROJETO/PPJ-Plano de Projeto.pptx
@@ -19,8 +19,8 @@
     <p:sldId id="259" r:id="rId13"/>
     <p:sldId id="264" r:id="rId14"/>
     <p:sldId id="261" r:id="rId15"/>
-    <p:sldId id="260" r:id="rId16"/>
-    <p:sldId id="262" r:id="rId17"/>
+    <p:sldId id="277" r:id="rId16"/>
+    <p:sldId id="278" r:id="rId17"/>
     <p:sldId id="263" r:id="rId18"/>
     <p:sldId id="274" r:id="rId19"/>
     <p:sldId id="275" r:id="rId20"/>
@@ -323,7 +323,7 @@
           <a:p>
             <a:fld id="{E47D05A7-B3F5-44B5-A242-7B096322FBAF}" type="datetimeFigureOut">
               <a:rPr lang="pt-BR" smtClean="0"/>
-              <a:t>06/12/2015</a:t>
+              <a:t>08/12/2015</a:t>
             </a:fld>
             <a:endParaRPr lang="pt-BR"/>
           </a:p>
@@ -493,7 +493,7 @@
           <a:p>
             <a:fld id="{E47D05A7-B3F5-44B5-A242-7B096322FBAF}" type="datetimeFigureOut">
               <a:rPr lang="pt-BR" smtClean="0"/>
-              <a:t>06/12/2015</a:t>
+              <a:t>08/12/2015</a:t>
             </a:fld>
             <a:endParaRPr lang="pt-BR"/>
           </a:p>
@@ -673,7 +673,7 @@
           <a:p>
             <a:fld id="{E47D05A7-B3F5-44B5-A242-7B096322FBAF}" type="datetimeFigureOut">
               <a:rPr lang="pt-BR" smtClean="0"/>
-              <a:t>06/12/2015</a:t>
+              <a:t>08/12/2015</a:t>
             </a:fld>
             <a:endParaRPr lang="pt-BR"/>
           </a:p>
@@ -843,7 +843,7 @@
           <a:p>
             <a:fld id="{E47D05A7-B3F5-44B5-A242-7B096322FBAF}" type="datetimeFigureOut">
               <a:rPr lang="pt-BR" smtClean="0"/>
-              <a:t>06/12/2015</a:t>
+              <a:t>08/12/2015</a:t>
             </a:fld>
             <a:endParaRPr lang="pt-BR"/>
           </a:p>
@@ -1089,7 +1089,7 @@
           <a:p>
             <a:fld id="{E47D05A7-B3F5-44B5-A242-7B096322FBAF}" type="datetimeFigureOut">
               <a:rPr lang="pt-BR" smtClean="0"/>
-              <a:t>06/12/2015</a:t>
+              <a:t>08/12/2015</a:t>
             </a:fld>
             <a:endParaRPr lang="pt-BR"/>
           </a:p>
@@ -1377,7 +1377,7 @@
           <a:p>
             <a:fld id="{E47D05A7-B3F5-44B5-A242-7B096322FBAF}" type="datetimeFigureOut">
               <a:rPr lang="pt-BR" smtClean="0"/>
-              <a:t>06/12/2015</a:t>
+              <a:t>08/12/2015</a:t>
             </a:fld>
             <a:endParaRPr lang="pt-BR"/>
           </a:p>
@@ -1799,7 +1799,7 @@
           <a:p>
             <a:fld id="{E47D05A7-B3F5-44B5-A242-7B096322FBAF}" type="datetimeFigureOut">
               <a:rPr lang="pt-BR" smtClean="0"/>
-              <a:t>06/12/2015</a:t>
+              <a:t>08/12/2015</a:t>
             </a:fld>
             <a:endParaRPr lang="pt-BR"/>
           </a:p>
@@ -1917,7 +1917,7 @@
           <a:p>
             <a:fld id="{E47D05A7-B3F5-44B5-A242-7B096322FBAF}" type="datetimeFigureOut">
               <a:rPr lang="pt-BR" smtClean="0"/>
-              <a:t>06/12/2015</a:t>
+              <a:t>08/12/2015</a:t>
             </a:fld>
             <a:endParaRPr lang="pt-BR"/>
           </a:p>
@@ -2012,7 +2012,7 @@
           <a:p>
             <a:fld id="{E47D05A7-B3F5-44B5-A242-7B096322FBAF}" type="datetimeFigureOut">
               <a:rPr lang="pt-BR" smtClean="0"/>
-              <a:t>06/12/2015</a:t>
+              <a:t>08/12/2015</a:t>
             </a:fld>
             <a:endParaRPr lang="pt-BR"/>
           </a:p>
@@ -2289,7 +2289,7 @@
           <a:p>
             <a:fld id="{E47D05A7-B3F5-44B5-A242-7B096322FBAF}" type="datetimeFigureOut">
               <a:rPr lang="pt-BR" smtClean="0"/>
-              <a:t>06/12/2015</a:t>
+              <a:t>08/12/2015</a:t>
             </a:fld>
             <a:endParaRPr lang="pt-BR"/>
           </a:p>
@@ -2542,7 +2542,7 @@
           <a:p>
             <a:fld id="{E47D05A7-B3F5-44B5-A242-7B096322FBAF}" type="datetimeFigureOut">
               <a:rPr lang="pt-BR" smtClean="0"/>
-              <a:t>06/12/2015</a:t>
+              <a:t>08/12/2015</a:t>
             </a:fld>
             <a:endParaRPr lang="pt-BR"/>
           </a:p>
@@ -2755,7 +2755,7 @@
           <a:p>
             <a:fld id="{E47D05A7-B3F5-44B5-A242-7B096322FBAF}" type="datetimeFigureOut">
               <a:rPr lang="pt-BR" smtClean="0"/>
-              <a:t>06/12/2015</a:t>
+              <a:t>08/12/2015</a:t>
             </a:fld>
             <a:endParaRPr lang="pt-BR"/>
           </a:p>
@@ -6318,81 +6318,50 @@
         </p:nvSpPr>
         <p:spPr/>
         <p:txBody>
-          <a:bodyPr/>
+          <a:bodyPr>
+            <a:normAutofit/>
+          </a:bodyPr>
           <a:lstStyle/>
           <a:p>
-            <a:r>
-              <a:rPr lang="en-US" dirty="0" smtClean="0"/>
-              <a:t>&lt;&lt;</a:t>
-            </a:r>
-            <a:r>
-              <a:rPr lang="en-US" dirty="0" err="1" smtClean="0"/>
-              <a:t>Declarar</a:t>
-            </a:r>
-            <a:r>
-              <a:rPr lang="en-US" dirty="0" smtClean="0"/>
-              <a:t> as </a:t>
-            </a:r>
-            <a:r>
-              <a:rPr lang="en-US" dirty="0" err="1" smtClean="0"/>
-              <a:t>premissas</a:t>
-            </a:r>
-            <a:r>
-              <a:rPr lang="en-US" dirty="0" smtClean="0"/>
-              <a:t> do </a:t>
-            </a:r>
-            <a:r>
-              <a:rPr lang="en-US" dirty="0" err="1" smtClean="0"/>
-              <a:t>projeto</a:t>
-            </a:r>
-            <a:r>
-              <a:rPr lang="en-US" dirty="0" smtClean="0"/>
-              <a:t>. </a:t>
-            </a:r>
-            <a:r>
-              <a:rPr lang="en-US" dirty="0" err="1" smtClean="0"/>
-              <a:t>Premissas</a:t>
-            </a:r>
-            <a:r>
-              <a:rPr lang="en-US" dirty="0" smtClean="0"/>
-              <a:t> </a:t>
-            </a:r>
-            <a:r>
-              <a:rPr lang="en-US" dirty="0" err="1" smtClean="0"/>
-              <a:t>são</a:t>
-            </a:r>
-            <a:r>
-              <a:rPr lang="en-US" dirty="0" smtClean="0"/>
-              <a:t> f</a:t>
-            </a:r>
-            <a:r>
-              <a:rPr lang="pt-BR" dirty="0" smtClean="0"/>
-              <a:t>atores </a:t>
-            </a:r>
-            <a:r>
-              <a:rPr lang="pt-BR" dirty="0"/>
-              <a:t>que, para fins de planejamento, são considerados verdadeiros, reais ou certos sem prova ou demonstração</a:t>
-            </a:r>
-            <a:r>
-              <a:rPr lang="pt-BR" dirty="0" smtClean="0"/>
-              <a:t>. Ex.: </a:t>
-            </a:r>
-            <a:r>
-              <a:rPr lang="pt-BR" dirty="0"/>
-              <a:t>O alvará para construir a casa estará aprovado pela prefeitura.Estamos assumindo que o alvará vai estar aprovado, não estamos considerando a hipótese de não ser aprovado.</a:t>
-            </a:r>
-            <a:r>
-              <a:rPr lang="pt-BR" dirty="0" smtClean="0"/>
-              <a:t>&gt;&gt;</a:t>
-            </a:r>
-            <a:endParaRPr lang="pt-BR" dirty="0"/>
+            <a:pPr algn="just"/>
+            <a:r>
+              <a:rPr lang="pt-BR" sz="2800" dirty="0" smtClean="0"/>
+              <a:t>Professores deverão manter atualizados os dados dos alunos presentes no sistema acadêmico;</a:t>
+            </a:r>
+          </a:p>
+          <a:p>
+            <a:pPr algn="just"/>
+            <a:r>
+              <a:rPr lang="pt-BR" sz="2800" dirty="0" smtClean="0"/>
+              <a:t>Alunos e funcionários do instituto, ambos usuários, deverão </a:t>
+            </a:r>
+            <a:r>
+              <a:rPr lang="pt-BR" sz="2800" dirty="0" smtClean="0"/>
+              <a:t>estar </a:t>
+            </a:r>
+            <a:r>
+              <a:rPr lang="pt-BR" sz="2800" dirty="0" smtClean="0"/>
+              <a:t>cadastro no sistema acadêmico e no SUAP, respectivamente</a:t>
+            </a:r>
+            <a:r>
+              <a:rPr lang="pt-BR" sz="2800" dirty="0" smtClean="0"/>
+              <a:t>;</a:t>
+            </a:r>
+          </a:p>
+          <a:p>
+            <a:pPr algn="just"/>
+            <a:r>
+              <a:rPr lang="pt-BR" sz="2800" dirty="0" smtClean="0"/>
+              <a:t>A concessão dos materiais pedagógicos estará, de fato, implantada no instituto como previsto por cliente.</a:t>
+            </a:r>
+            <a:endParaRPr lang="pt-BR" sz="2800" dirty="0" smtClean="0"/>
           </a:p>
         </p:txBody>
       </p:sp>
     </p:spTree>
     <p:extLst>
       <p:ext uri="{BB962C8B-B14F-4D97-AF65-F5344CB8AC3E}">
-        <p14:creationId xmlns:p14="http://schemas.microsoft.com/office/powerpoint/2010/main" val="2691214809"/>
+        <p14:creationId xmlns:p14="http://schemas.microsoft.com/office/powerpoint/2010/main" val="550465481"/>
       </p:ext>
     </p:extLst>
   </p:cSld>
@@ -6464,50 +6433,46 @@
           <a:bodyPr/>
           <a:lstStyle/>
           <a:p>
-            <a:r>
-              <a:rPr lang="en-US" dirty="0" smtClean="0"/>
-              <a:t>&lt;&lt;</a:t>
-            </a:r>
-            <a:r>
-              <a:rPr lang="en-US" dirty="0" err="1" smtClean="0"/>
-              <a:t>Definir</a:t>
-            </a:r>
-            <a:r>
-              <a:rPr lang="en-US" dirty="0" smtClean="0"/>
-              <a:t> as </a:t>
-            </a:r>
-            <a:r>
-              <a:rPr lang="en-US" dirty="0" err="1" smtClean="0"/>
-              <a:t>restrições</a:t>
-            </a:r>
-            <a:r>
-              <a:rPr lang="en-US" dirty="0" smtClean="0"/>
-              <a:t> do </a:t>
-            </a:r>
-            <a:r>
-              <a:rPr lang="en-US" dirty="0" err="1" smtClean="0"/>
-              <a:t>projeto</a:t>
-            </a:r>
-            <a:r>
-              <a:rPr lang="en-US" dirty="0" smtClean="0"/>
-              <a:t>. </a:t>
+            <a:pPr algn="just"/>
+            <a:r>
+              <a:rPr lang="pt-BR" dirty="0" smtClean="0"/>
+              <a:t>O sistema deve ser acessível do site da </a:t>
             </a:r>
             <a:r>
               <a:rPr lang="pt-BR" dirty="0"/>
-              <a:t>Uma restrição ou limitação aplicável, interna ou externa, a um projeto, a qual afetará o desempenho do projeto ou de um processo</a:t>
+              <a:t>instituição </a:t>
             </a:r>
             <a:r>
               <a:rPr lang="pt-BR" dirty="0" smtClean="0"/>
-              <a:t>.&gt;&gt;</a:t>
-            </a:r>
-            <a:endParaRPr lang="pt-BR" dirty="0"/>
+              <a:t>(</a:t>
+            </a:r>
+            <a:r>
+              <a:rPr lang="pt-BR" dirty="0" smtClean="0">
+                <a:hlinkClick r:id="rId2"/>
+              </a:rPr>
+              <a:t>www.ifpb.edu.br</a:t>
+            </a:r>
+            <a:r>
+              <a:rPr lang="pt-BR" dirty="0" smtClean="0"/>
+              <a:t>);</a:t>
+            </a:r>
+          </a:p>
+          <a:p>
+            <a:pPr algn="just"/>
+            <a:r>
+              <a:rPr lang="pt-BR" dirty="0" smtClean="0"/>
+              <a:t>O sistema deve ser implantado em um ambiente Linux.</a:t>
+            </a:r>
+          </a:p>
+          <a:p>
+            <a:endParaRPr lang="pt-BR" dirty="0" smtClean="0"/>
           </a:p>
         </p:txBody>
       </p:sp>
     </p:spTree>
     <p:extLst>
       <p:ext uri="{BB962C8B-B14F-4D97-AF65-F5344CB8AC3E}">
-        <p14:creationId xmlns:p14="http://schemas.microsoft.com/office/powerpoint/2010/main" val="251989430"/>
+        <p14:creationId xmlns:p14="http://schemas.microsoft.com/office/powerpoint/2010/main" val="1423893767"/>
       </p:ext>
     </p:extLst>
   </p:cSld>

</xml_diff>